<commit_message>
Updated matlab files and slides
</commit_message>
<xml_diff>
--- a/NMDFB/PMEPR.pptx
+++ b/NMDFB/PMEPR.pptx
@@ -9,8 +9,9 @@
     <p:sldId id="257" r:id="rId3"/>
     <p:sldId id="258" r:id="rId4"/>
     <p:sldId id="259" r:id="rId5"/>
+    <p:sldId id="260" r:id="rId6"/>
   </p:sldIdLst>
-  <p:sldSz cx="9144000" cy="6858000" type="screen4x3"/>
+  <p:sldSz cx="9144000" cy="5143500" type="screen16x9"/>
   <p:notesSz cx="6858000" cy="9144000"/>
   <p:defaultTextStyle>
     <a:defPPr>
@@ -139,8 +140,8 @@
         </p:nvSpPr>
         <p:spPr>
           <a:xfrm>
-            <a:off x="685800" y="2130425"/>
-            <a:ext cx="7772400" cy="1470025"/>
+            <a:off x="685800" y="1597819"/>
+            <a:ext cx="7772400" cy="1102519"/>
           </a:xfrm>
         </p:spPr>
         <p:txBody>
@@ -167,8 +168,8 @@
         </p:nvSpPr>
         <p:spPr>
           <a:xfrm>
-            <a:off x="1371600" y="3886200"/>
-            <a:ext cx="6400800" cy="1752600"/>
+            <a:off x="1371600" y="2914650"/>
+            <a:ext cx="6400800" cy="1314450"/>
           </a:xfrm>
         </p:spPr>
         <p:txBody>
@@ -291,7 +292,7 @@
           <a:p>
             <a:fld id="{735D3301-CB39-DC43-97BD-06445F9B8DB5}" type="datetimeFigureOut">
               <a:rPr lang="en-US" smtClean="0"/>
-              <a:t>9/16/14</a:t>
+              <a:t>9/17/14</a:t>
             </a:fld>
             <a:endParaRPr lang="en-US"/>
           </a:p>
@@ -461,7 +462,7 @@
           <a:p>
             <a:fld id="{735D3301-CB39-DC43-97BD-06445F9B8DB5}" type="datetimeFigureOut">
               <a:rPr lang="en-US" smtClean="0"/>
-              <a:t>9/16/14</a:t>
+              <a:t>9/17/14</a:t>
             </a:fld>
             <a:endParaRPr lang="en-US"/>
           </a:p>
@@ -551,8 +552,8 @@
         </p:nvSpPr>
         <p:spPr>
           <a:xfrm>
-            <a:off x="6629400" y="274638"/>
-            <a:ext cx="2057400" cy="5851525"/>
+            <a:off x="6629400" y="205979"/>
+            <a:ext cx="2057400" cy="4388644"/>
           </a:xfrm>
         </p:spPr>
         <p:txBody>
@@ -579,8 +580,8 @@
         </p:nvSpPr>
         <p:spPr>
           <a:xfrm>
-            <a:off x="457200" y="274638"/>
-            <a:ext cx="6019800" cy="5851525"/>
+            <a:off x="457200" y="205979"/>
+            <a:ext cx="6019800" cy="4388644"/>
           </a:xfrm>
         </p:spPr>
         <p:txBody>
@@ -641,7 +642,7 @@
           <a:p>
             <a:fld id="{735D3301-CB39-DC43-97BD-06445F9B8DB5}" type="datetimeFigureOut">
               <a:rPr lang="en-US" smtClean="0"/>
-              <a:t>9/16/14</a:t>
+              <a:t>9/17/14</a:t>
             </a:fld>
             <a:endParaRPr lang="en-US"/>
           </a:p>
@@ -811,7 +812,7 @@
           <a:p>
             <a:fld id="{735D3301-CB39-DC43-97BD-06445F9B8DB5}" type="datetimeFigureOut">
               <a:rPr lang="en-US" smtClean="0"/>
-              <a:t>9/16/14</a:t>
+              <a:t>9/17/14</a:t>
             </a:fld>
             <a:endParaRPr lang="en-US"/>
           </a:p>
@@ -901,8 +902,8 @@
         </p:nvSpPr>
         <p:spPr>
           <a:xfrm>
-            <a:off x="722313" y="4406900"/>
-            <a:ext cx="7772400" cy="1362075"/>
+            <a:off x="722313" y="3305176"/>
+            <a:ext cx="7772400" cy="1021556"/>
           </a:xfrm>
         </p:spPr>
         <p:txBody>
@@ -933,8 +934,8 @@
         </p:nvSpPr>
         <p:spPr>
           <a:xfrm>
-            <a:off x="722313" y="2906713"/>
-            <a:ext cx="7772400" cy="1500187"/>
+            <a:off x="722313" y="2180035"/>
+            <a:ext cx="7772400" cy="1125140"/>
           </a:xfrm>
         </p:spPr>
         <p:txBody>
@@ -1057,7 +1058,7 @@
           <a:p>
             <a:fld id="{735D3301-CB39-DC43-97BD-06445F9B8DB5}" type="datetimeFigureOut">
               <a:rPr lang="en-US" smtClean="0"/>
-              <a:t>9/16/14</a:t>
+              <a:t>9/17/14</a:t>
             </a:fld>
             <a:endParaRPr lang="en-US"/>
           </a:p>
@@ -1170,8 +1171,8 @@
         </p:nvSpPr>
         <p:spPr>
           <a:xfrm>
-            <a:off x="457200" y="1600200"/>
-            <a:ext cx="4038600" cy="4525963"/>
+            <a:off x="457200" y="1200151"/>
+            <a:ext cx="4038600" cy="3394472"/>
           </a:xfrm>
         </p:spPr>
         <p:txBody>
@@ -1255,8 +1256,8 @@
         </p:nvSpPr>
         <p:spPr>
           <a:xfrm>
-            <a:off x="4648200" y="1600200"/>
-            <a:ext cx="4038600" cy="4525963"/>
+            <a:off x="4648200" y="1200151"/>
+            <a:ext cx="4038600" cy="3394472"/>
           </a:xfrm>
         </p:spPr>
         <p:txBody>
@@ -1345,7 +1346,7 @@
           <a:p>
             <a:fld id="{735D3301-CB39-DC43-97BD-06445F9B8DB5}" type="datetimeFigureOut">
               <a:rPr lang="en-US" smtClean="0"/>
-              <a:t>9/16/14</a:t>
+              <a:t>9/17/14</a:t>
             </a:fld>
             <a:endParaRPr lang="en-US"/>
           </a:p>
@@ -1462,8 +1463,8 @@
         </p:nvSpPr>
         <p:spPr>
           <a:xfrm>
-            <a:off x="457200" y="1535113"/>
-            <a:ext cx="4040188" cy="639762"/>
+            <a:off x="457200" y="1151335"/>
+            <a:ext cx="4040188" cy="479822"/>
           </a:xfrm>
         </p:spPr>
         <p:txBody>
@@ -1527,8 +1528,8 @@
         </p:nvSpPr>
         <p:spPr>
           <a:xfrm>
-            <a:off x="457200" y="2174875"/>
-            <a:ext cx="4040188" cy="3951288"/>
+            <a:off x="457200" y="1631156"/>
+            <a:ext cx="4040188" cy="2963466"/>
           </a:xfrm>
         </p:spPr>
         <p:txBody>
@@ -1612,8 +1613,8 @@
         </p:nvSpPr>
         <p:spPr>
           <a:xfrm>
-            <a:off x="4645025" y="1535113"/>
-            <a:ext cx="4041775" cy="639762"/>
+            <a:off x="4645026" y="1151335"/>
+            <a:ext cx="4041775" cy="479822"/>
           </a:xfrm>
         </p:spPr>
         <p:txBody>
@@ -1677,8 +1678,8 @@
         </p:nvSpPr>
         <p:spPr>
           <a:xfrm>
-            <a:off x="4645025" y="2174875"/>
-            <a:ext cx="4041775" cy="3951288"/>
+            <a:off x="4645026" y="1631156"/>
+            <a:ext cx="4041775" cy="2963466"/>
           </a:xfrm>
         </p:spPr>
         <p:txBody>
@@ -1767,7 +1768,7 @@
           <a:p>
             <a:fld id="{735D3301-CB39-DC43-97BD-06445F9B8DB5}" type="datetimeFigureOut">
               <a:rPr lang="en-US" smtClean="0"/>
-              <a:t>9/16/14</a:t>
+              <a:t>9/17/14</a:t>
             </a:fld>
             <a:endParaRPr lang="en-US"/>
           </a:p>
@@ -1885,7 +1886,7 @@
           <a:p>
             <a:fld id="{735D3301-CB39-DC43-97BD-06445F9B8DB5}" type="datetimeFigureOut">
               <a:rPr lang="en-US" smtClean="0"/>
-              <a:t>9/16/14</a:t>
+              <a:t>9/17/14</a:t>
             </a:fld>
             <a:endParaRPr lang="en-US"/>
           </a:p>
@@ -1980,7 +1981,7 @@
           <a:p>
             <a:fld id="{735D3301-CB39-DC43-97BD-06445F9B8DB5}" type="datetimeFigureOut">
               <a:rPr lang="en-US" smtClean="0"/>
-              <a:t>9/16/14</a:t>
+              <a:t>9/17/14</a:t>
             </a:fld>
             <a:endParaRPr lang="en-US"/>
           </a:p>
@@ -2070,8 +2071,8 @@
         </p:nvSpPr>
         <p:spPr>
           <a:xfrm>
-            <a:off x="457200" y="273050"/>
-            <a:ext cx="3008313" cy="1162050"/>
+            <a:off x="457201" y="204787"/>
+            <a:ext cx="3008313" cy="871538"/>
           </a:xfrm>
         </p:spPr>
         <p:txBody>
@@ -2102,8 +2103,8 @@
         </p:nvSpPr>
         <p:spPr>
           <a:xfrm>
-            <a:off x="3575050" y="273050"/>
-            <a:ext cx="5111750" cy="5853113"/>
+            <a:off x="3575050" y="204788"/>
+            <a:ext cx="5111750" cy="4389835"/>
           </a:xfrm>
         </p:spPr>
         <p:txBody>
@@ -2187,8 +2188,8 @@
         </p:nvSpPr>
         <p:spPr>
           <a:xfrm>
-            <a:off x="457200" y="1435100"/>
-            <a:ext cx="3008313" cy="4691063"/>
+            <a:off x="457201" y="1076326"/>
+            <a:ext cx="3008313" cy="3518297"/>
           </a:xfrm>
         </p:spPr>
         <p:txBody>
@@ -2257,7 +2258,7 @@
           <a:p>
             <a:fld id="{735D3301-CB39-DC43-97BD-06445F9B8DB5}" type="datetimeFigureOut">
               <a:rPr lang="en-US" smtClean="0"/>
-              <a:t>9/16/14</a:t>
+              <a:t>9/17/14</a:t>
             </a:fld>
             <a:endParaRPr lang="en-US"/>
           </a:p>
@@ -2347,8 +2348,8 @@
         </p:nvSpPr>
         <p:spPr>
           <a:xfrm>
-            <a:off x="1792288" y="4800600"/>
-            <a:ext cx="5486400" cy="566738"/>
+            <a:off x="1792288" y="3600450"/>
+            <a:ext cx="5486400" cy="425054"/>
           </a:xfrm>
         </p:spPr>
         <p:txBody>
@@ -2379,8 +2380,8 @@
         </p:nvSpPr>
         <p:spPr>
           <a:xfrm>
-            <a:off x="1792288" y="612775"/>
-            <a:ext cx="5486400" cy="4114800"/>
+            <a:off x="1792288" y="459581"/>
+            <a:ext cx="5486400" cy="3086100"/>
           </a:xfrm>
         </p:spPr>
         <p:txBody>
@@ -2440,8 +2441,8 @@
         </p:nvSpPr>
         <p:spPr>
           <a:xfrm>
-            <a:off x="1792288" y="5367338"/>
-            <a:ext cx="5486400" cy="804862"/>
+            <a:off x="1792288" y="4025503"/>
+            <a:ext cx="5486400" cy="603647"/>
           </a:xfrm>
         </p:spPr>
         <p:txBody>
@@ -2510,7 +2511,7 @@
           <a:p>
             <a:fld id="{735D3301-CB39-DC43-97BD-06445F9B8DB5}" type="datetimeFigureOut">
               <a:rPr lang="en-US" smtClean="0"/>
-              <a:t>9/16/14</a:t>
+              <a:t>9/17/14</a:t>
             </a:fld>
             <a:endParaRPr lang="en-US"/>
           </a:p>
@@ -2605,8 +2606,8 @@
         </p:nvSpPr>
         <p:spPr>
           <a:xfrm>
-            <a:off x="457200" y="274638"/>
-            <a:ext cx="8229600" cy="1143000"/>
+            <a:off x="457200" y="205979"/>
+            <a:ext cx="8229600" cy="857250"/>
           </a:xfrm>
           <a:prstGeom prst="rect">
             <a:avLst/>
@@ -2638,8 +2639,8 @@
         </p:nvSpPr>
         <p:spPr>
           <a:xfrm>
-            <a:off x="457200" y="1600200"/>
-            <a:ext cx="8229600" cy="4525963"/>
+            <a:off x="457200" y="1200151"/>
+            <a:ext cx="8229600" cy="3394472"/>
           </a:xfrm>
           <a:prstGeom prst="rect">
             <a:avLst/>
@@ -2700,8 +2701,8 @@
         </p:nvSpPr>
         <p:spPr>
           <a:xfrm>
-            <a:off x="457200" y="6356350"/>
-            <a:ext cx="2133600" cy="365125"/>
+            <a:off x="457200" y="4767263"/>
+            <a:ext cx="2133600" cy="273844"/>
           </a:xfrm>
           <a:prstGeom prst="rect">
             <a:avLst/>
@@ -2723,7 +2724,7 @@
           <a:p>
             <a:fld id="{735D3301-CB39-DC43-97BD-06445F9B8DB5}" type="datetimeFigureOut">
               <a:rPr lang="en-US" smtClean="0"/>
-              <a:t>9/16/14</a:t>
+              <a:t>9/17/14</a:t>
             </a:fld>
             <a:endParaRPr lang="en-US"/>
           </a:p>
@@ -2741,8 +2742,8 @@
         </p:nvSpPr>
         <p:spPr>
           <a:xfrm>
-            <a:off x="3124200" y="6356350"/>
-            <a:ext cx="2895600" cy="365125"/>
+            <a:off x="3124200" y="4767263"/>
+            <a:ext cx="2895600" cy="273844"/>
           </a:xfrm>
           <a:prstGeom prst="rect">
             <a:avLst/>
@@ -2778,8 +2779,8 @@
         </p:nvSpPr>
         <p:spPr>
           <a:xfrm>
-            <a:off x="6553200" y="6356350"/>
-            <a:ext cx="2133600" cy="365125"/>
+            <a:off x="6553200" y="4767263"/>
+            <a:ext cx="2133600" cy="273844"/>
           </a:xfrm>
           <a:prstGeom prst="rect">
             <a:avLst/>
@@ -3201,13 +3202,13 @@
         </p:nvSpPr>
         <p:spPr>
           <a:xfrm>
-            <a:off x="457200" y="1613294"/>
-            <a:ext cx="8229600" cy="4525963"/>
+            <a:off x="457200" y="1209971"/>
+            <a:ext cx="8229600" cy="3394472"/>
           </a:xfrm>
         </p:spPr>
         <p:txBody>
           <a:bodyPr>
-            <a:normAutofit fontScale="85000" lnSpcReduction="20000"/>
+            <a:normAutofit fontScale="70000" lnSpcReduction="20000"/>
           </a:bodyPr>
           <a:lstStyle/>
           <a:p>
@@ -3411,7 +3412,7 @@
         <p:spPr/>
         <p:txBody>
           <a:bodyPr>
-            <a:normAutofit fontScale="70000" lnSpcReduction="20000"/>
+            <a:normAutofit fontScale="55000" lnSpcReduction="20000"/>
           </a:bodyPr>
           <a:lstStyle/>
           <a:p>
@@ -3523,6 +3524,3105 @@
     <p:extLst>
       <p:ext uri="{BB962C8B-B14F-4D97-AF65-F5344CB8AC3E}">
         <p14:creationId xmlns:p14="http://schemas.microsoft.com/office/powerpoint/2010/main" val="3630065021"/>
+      </p:ext>
+    </p:extLst>
+  </p:cSld>
+  <p:clrMapOvr>
+    <a:masterClrMapping/>
+  </p:clrMapOvr>
+</p:sld>
+</file>
+
+<file path=ppt/slides/slide5.xml><?xml version="1.0" encoding="utf-8"?>
+<p:sld xmlns:a="http://schemas.openxmlformats.org/drawingml/2006/main" xmlns:r="http://schemas.openxmlformats.org/officeDocument/2006/relationships" xmlns:p="http://schemas.openxmlformats.org/presentationml/2006/main">
+  <p:cSld>
+    <p:spTree>
+      <p:nvGrpSpPr>
+        <p:cNvPr id="1" name=""/>
+        <p:cNvGrpSpPr/>
+        <p:nvPr/>
+      </p:nvGrpSpPr>
+      <p:grpSpPr>
+        <a:xfrm>
+          <a:off x="0" y="0"/>
+          <a:ext cx="0" cy="0"/>
+          <a:chOff x="0" y="0"/>
+          <a:chExt cx="0" cy="0"/>
+        </a:xfrm>
+      </p:grpSpPr>
+      <p:grpSp>
+        <p:nvGrpSpPr>
+          <p:cNvPr id="72" name="Group 71"/>
+          <p:cNvGrpSpPr/>
+          <p:nvPr/>
+        </p:nvGrpSpPr>
+        <p:grpSpPr>
+          <a:xfrm>
+            <a:off x="660895" y="907015"/>
+            <a:ext cx="2477527" cy="811666"/>
+            <a:chOff x="660895" y="1271965"/>
+            <a:chExt cx="2477527" cy="811666"/>
+          </a:xfrm>
+        </p:grpSpPr>
+        <p:cxnSp>
+          <p:nvCxnSpPr>
+            <p:cNvPr id="8" name="Straight Arrow Connector 7"/>
+            <p:cNvCxnSpPr/>
+            <p:nvPr/>
+          </p:nvCxnSpPr>
+          <p:spPr>
+            <a:xfrm flipV="1">
+              <a:off x="660895" y="1829717"/>
+              <a:ext cx="2477527" cy="4860"/>
+            </a:xfrm>
+            <a:prstGeom prst="straightConnector1">
+              <a:avLst/>
+            </a:prstGeom>
+            <a:ln>
+              <a:solidFill>
+                <a:schemeClr val="tx1"/>
+              </a:solidFill>
+              <a:tailEnd type="none"/>
+            </a:ln>
+            <a:effectLst/>
+          </p:spPr>
+          <p:style>
+            <a:lnRef idx="2">
+              <a:schemeClr val="accent1"/>
+            </a:lnRef>
+            <a:fillRef idx="0">
+              <a:schemeClr val="accent1"/>
+            </a:fillRef>
+            <a:effectRef idx="1">
+              <a:schemeClr val="accent1"/>
+            </a:effectRef>
+            <a:fontRef idx="minor">
+              <a:schemeClr val="tx1"/>
+            </a:fontRef>
+          </p:style>
+        </p:cxnSp>
+        <p:sp>
+          <p:nvSpPr>
+            <p:cNvPr id="6" name="Trapezoid 5"/>
+            <p:cNvSpPr/>
+            <p:nvPr/>
+          </p:nvSpPr>
+          <p:spPr>
+            <a:xfrm>
+              <a:off x="1616387" y="1542989"/>
+              <a:ext cx="161984" cy="286728"/>
+            </a:xfrm>
+            <a:prstGeom prst="trapezoid">
+              <a:avLst/>
+            </a:prstGeom>
+            <a:solidFill>
+              <a:srgbClr val="F9ED59"/>
+            </a:solidFill>
+            <a:ln>
+              <a:solidFill>
+                <a:schemeClr val="tx1"/>
+              </a:solidFill>
+            </a:ln>
+            <a:effectLst/>
+          </p:spPr>
+          <p:style>
+            <a:lnRef idx="1">
+              <a:schemeClr val="accent1"/>
+            </a:lnRef>
+            <a:fillRef idx="3">
+              <a:schemeClr val="accent1"/>
+            </a:fillRef>
+            <a:effectRef idx="2">
+              <a:schemeClr val="accent1"/>
+            </a:effectRef>
+            <a:fontRef idx="minor">
+              <a:schemeClr val="lt1"/>
+            </a:fontRef>
+          </p:style>
+          <p:txBody>
+            <a:bodyPr rtlCol="0" anchor="ctr"/>
+            <a:lstStyle/>
+            <a:p>
+              <a:pPr algn="ctr"/>
+              <a:endParaRPr lang="en-US"/>
+            </a:p>
+          </p:txBody>
+        </p:sp>
+        <p:cxnSp>
+          <p:nvCxnSpPr>
+            <p:cNvPr id="10" name="Straight Connector 9"/>
+            <p:cNvCxnSpPr>
+              <a:stCxn id="6" idx="0"/>
+              <a:endCxn id="6" idx="2"/>
+            </p:cNvCxnSpPr>
+            <p:nvPr/>
+          </p:nvCxnSpPr>
+          <p:spPr>
+            <a:xfrm>
+              <a:off x="1697379" y="1542989"/>
+              <a:ext cx="0" cy="286728"/>
+            </a:xfrm>
+            <a:prstGeom prst="line">
+              <a:avLst/>
+            </a:prstGeom>
+            <a:ln w="3175" cmpd="sng">
+              <a:solidFill>
+                <a:schemeClr val="tx1"/>
+              </a:solidFill>
+              <a:prstDash val="dash"/>
+            </a:ln>
+          </p:spPr>
+          <p:style>
+            <a:lnRef idx="2">
+              <a:schemeClr val="accent1"/>
+            </a:lnRef>
+            <a:fillRef idx="0">
+              <a:schemeClr val="accent1"/>
+            </a:fillRef>
+            <a:effectRef idx="1">
+              <a:schemeClr val="accent1"/>
+            </a:effectRef>
+            <a:fontRef idx="minor">
+              <a:schemeClr val="tx1"/>
+            </a:fontRef>
+          </p:style>
+        </p:cxnSp>
+        <p:sp>
+          <p:nvSpPr>
+            <p:cNvPr id="15" name="TextBox 14"/>
+            <p:cNvSpPr txBox="1"/>
+            <p:nvPr/>
+          </p:nvSpPr>
+          <p:spPr>
+            <a:xfrm>
+              <a:off x="764232" y="1806632"/>
+              <a:ext cx="278610" cy="276999"/>
+            </a:xfrm>
+            <a:prstGeom prst="rect">
+              <a:avLst/>
+            </a:prstGeom>
+            <a:noFill/>
+          </p:spPr>
+          <p:txBody>
+            <a:bodyPr wrap="square" rtlCol="0">
+              <a:spAutoFit/>
+            </a:bodyPr>
+            <a:lstStyle/>
+            <a:p>
+              <a:r>
+                <a:rPr lang="en-US" sz="1200" i="1" dirty="0" smtClean="0">
+                  <a:latin typeface="Microsoft Sans Serif"/>
+                  <a:cs typeface="Microsoft Sans Serif"/>
+                </a:rPr>
+                <a:t>f</a:t>
+              </a:r>
+              <a:r>
+                <a:rPr lang="en-US" sz="1200" baseline="-25000" dirty="0" smtClean="0">
+                  <a:latin typeface="Microsoft Sans Serif"/>
+                  <a:cs typeface="Microsoft Sans Serif"/>
+                </a:rPr>
+                <a:t>1</a:t>
+              </a:r>
+              <a:endParaRPr lang="en-US" sz="1200" baseline="-25000" dirty="0">
+                <a:latin typeface="Microsoft Sans Serif"/>
+                <a:cs typeface="Microsoft Sans Serif"/>
+              </a:endParaRPr>
+            </a:p>
+          </p:txBody>
+        </p:sp>
+        <p:sp>
+          <p:nvSpPr>
+            <p:cNvPr id="16" name="TextBox 15"/>
+            <p:cNvSpPr txBox="1"/>
+            <p:nvPr/>
+          </p:nvSpPr>
+          <p:spPr>
+            <a:xfrm>
+              <a:off x="733529" y="1271966"/>
+              <a:ext cx="340017" cy="276999"/>
+            </a:xfrm>
+            <a:prstGeom prst="rect">
+              <a:avLst/>
+            </a:prstGeom>
+            <a:noFill/>
+          </p:spPr>
+          <p:txBody>
+            <a:bodyPr wrap="square" rtlCol="0">
+              <a:spAutoFit/>
+            </a:bodyPr>
+            <a:lstStyle/>
+            <a:p>
+              <a:r>
+                <a:rPr lang="en-US" sz="1200" i="1" dirty="0">
+                  <a:latin typeface="Microsoft Sans Serif"/>
+                  <a:cs typeface="Microsoft Sans Serif"/>
+                </a:rPr>
+                <a:t>S</a:t>
+              </a:r>
+              <a:r>
+                <a:rPr lang="en-US" sz="1200" baseline="-25000" dirty="0" smtClean="0">
+                  <a:latin typeface="Microsoft Sans Serif"/>
+                  <a:cs typeface="Microsoft Sans Serif"/>
+                </a:rPr>
+                <a:t>1</a:t>
+              </a:r>
+              <a:endParaRPr lang="en-US" sz="1200" baseline="-25000" dirty="0">
+                <a:latin typeface="Microsoft Sans Serif"/>
+                <a:cs typeface="Microsoft Sans Serif"/>
+              </a:endParaRPr>
+            </a:p>
+          </p:txBody>
+        </p:sp>
+        <p:sp>
+          <p:nvSpPr>
+            <p:cNvPr id="22" name="Trapezoid 21"/>
+            <p:cNvSpPr/>
+            <p:nvPr/>
+          </p:nvSpPr>
+          <p:spPr>
+            <a:xfrm>
+              <a:off x="778037" y="1542991"/>
+              <a:ext cx="251001" cy="286728"/>
+            </a:xfrm>
+            <a:prstGeom prst="trapezoid">
+              <a:avLst/>
+            </a:prstGeom>
+            <a:solidFill>
+              <a:srgbClr val="F9ED59"/>
+            </a:solidFill>
+            <a:ln>
+              <a:solidFill>
+                <a:schemeClr val="tx1"/>
+              </a:solidFill>
+            </a:ln>
+            <a:effectLst/>
+          </p:spPr>
+          <p:style>
+            <a:lnRef idx="1">
+              <a:schemeClr val="accent1"/>
+            </a:lnRef>
+            <a:fillRef idx="3">
+              <a:schemeClr val="accent1"/>
+            </a:fillRef>
+            <a:effectRef idx="2">
+              <a:schemeClr val="accent1"/>
+            </a:effectRef>
+            <a:fontRef idx="minor">
+              <a:schemeClr val="lt1"/>
+            </a:fontRef>
+          </p:style>
+          <p:txBody>
+            <a:bodyPr rtlCol="0" anchor="ctr"/>
+            <a:lstStyle/>
+            <a:p>
+              <a:pPr algn="ctr"/>
+              <a:endParaRPr lang="en-US"/>
+            </a:p>
+          </p:txBody>
+        </p:sp>
+        <p:cxnSp>
+          <p:nvCxnSpPr>
+            <p:cNvPr id="23" name="Straight Connector 22"/>
+            <p:cNvCxnSpPr>
+              <a:stCxn id="22" idx="0"/>
+              <a:endCxn id="22" idx="2"/>
+            </p:cNvCxnSpPr>
+            <p:nvPr/>
+          </p:nvCxnSpPr>
+          <p:spPr>
+            <a:xfrm>
+              <a:off x="903538" y="1542991"/>
+              <a:ext cx="0" cy="286728"/>
+            </a:xfrm>
+            <a:prstGeom prst="line">
+              <a:avLst/>
+            </a:prstGeom>
+            <a:ln w="3175" cmpd="sng">
+              <a:solidFill>
+                <a:schemeClr val="tx1"/>
+              </a:solidFill>
+              <a:prstDash val="dash"/>
+            </a:ln>
+          </p:spPr>
+          <p:style>
+            <a:lnRef idx="2">
+              <a:schemeClr val="accent1"/>
+            </a:lnRef>
+            <a:fillRef idx="0">
+              <a:schemeClr val="accent1"/>
+            </a:fillRef>
+            <a:effectRef idx="1">
+              <a:schemeClr val="accent1"/>
+            </a:effectRef>
+            <a:fontRef idx="minor">
+              <a:schemeClr val="tx1"/>
+            </a:fontRef>
+          </p:style>
+        </p:cxnSp>
+        <p:sp>
+          <p:nvSpPr>
+            <p:cNvPr id="20" name="TextBox 19"/>
+            <p:cNvSpPr txBox="1"/>
+            <p:nvPr/>
+          </p:nvSpPr>
+          <p:spPr>
+            <a:xfrm>
+              <a:off x="1558074" y="1806631"/>
+              <a:ext cx="278610" cy="276999"/>
+            </a:xfrm>
+            <a:prstGeom prst="rect">
+              <a:avLst/>
+            </a:prstGeom>
+            <a:noFill/>
+          </p:spPr>
+          <p:txBody>
+            <a:bodyPr wrap="square" rtlCol="0">
+              <a:spAutoFit/>
+            </a:bodyPr>
+            <a:lstStyle/>
+            <a:p>
+              <a:r>
+                <a:rPr lang="en-US" sz="1200" i="1" dirty="0" smtClean="0">
+                  <a:latin typeface="Microsoft Sans Serif"/>
+                  <a:cs typeface="Microsoft Sans Serif"/>
+                </a:rPr>
+                <a:t>f</a:t>
+              </a:r>
+              <a:r>
+                <a:rPr lang="en-US" sz="1200" baseline="-25000" dirty="0">
+                  <a:latin typeface="Microsoft Sans Serif"/>
+                  <a:cs typeface="Microsoft Sans Serif"/>
+                </a:rPr>
+                <a:t>2</a:t>
+              </a:r>
+            </a:p>
+          </p:txBody>
+        </p:sp>
+        <p:sp>
+          <p:nvSpPr>
+            <p:cNvPr id="21" name="TextBox 20"/>
+            <p:cNvSpPr txBox="1"/>
+            <p:nvPr/>
+          </p:nvSpPr>
+          <p:spPr>
+            <a:xfrm>
+              <a:off x="1527372" y="1271965"/>
+              <a:ext cx="340017" cy="276999"/>
+            </a:xfrm>
+            <a:prstGeom prst="rect">
+              <a:avLst/>
+            </a:prstGeom>
+            <a:noFill/>
+          </p:spPr>
+          <p:txBody>
+            <a:bodyPr wrap="square" rtlCol="0">
+              <a:spAutoFit/>
+            </a:bodyPr>
+            <a:lstStyle/>
+            <a:p>
+              <a:r>
+                <a:rPr lang="en-US" sz="1200" i="1" dirty="0" smtClean="0">
+                  <a:latin typeface="Microsoft Sans Serif"/>
+                  <a:cs typeface="Microsoft Sans Serif"/>
+                </a:rPr>
+                <a:t>S</a:t>
+              </a:r>
+              <a:r>
+                <a:rPr lang="en-US" sz="1200" baseline="-25000" dirty="0">
+                  <a:latin typeface="Microsoft Sans Serif"/>
+                  <a:cs typeface="Microsoft Sans Serif"/>
+                </a:rPr>
+                <a:t>2</a:t>
+              </a:r>
+            </a:p>
+          </p:txBody>
+        </p:sp>
+        <p:grpSp>
+          <p:nvGrpSpPr>
+            <p:cNvPr id="25" name="Group 24"/>
+            <p:cNvGrpSpPr/>
+            <p:nvPr/>
+          </p:nvGrpSpPr>
+          <p:grpSpPr>
+            <a:xfrm>
+              <a:off x="2035298" y="1542989"/>
+              <a:ext cx="297638" cy="286728"/>
+              <a:chOff x="1347709" y="2063799"/>
+              <a:chExt cx="161984" cy="382304"/>
+            </a:xfrm>
+          </p:grpSpPr>
+          <p:sp>
+            <p:nvSpPr>
+              <p:cNvPr id="28" name="Trapezoid 27"/>
+              <p:cNvSpPr/>
+              <p:nvPr/>
+            </p:nvSpPr>
+            <p:spPr>
+              <a:xfrm>
+                <a:off x="1347709" y="2063799"/>
+                <a:ext cx="161984" cy="382304"/>
+              </a:xfrm>
+              <a:prstGeom prst="trapezoid">
+                <a:avLst/>
+              </a:prstGeom>
+              <a:solidFill>
+                <a:srgbClr val="F9ED59"/>
+              </a:solidFill>
+              <a:ln>
+                <a:solidFill>
+                  <a:schemeClr val="tx1"/>
+                </a:solidFill>
+              </a:ln>
+              <a:effectLst/>
+            </p:spPr>
+            <p:style>
+              <a:lnRef idx="1">
+                <a:schemeClr val="accent1"/>
+              </a:lnRef>
+              <a:fillRef idx="3">
+                <a:schemeClr val="accent1"/>
+              </a:fillRef>
+              <a:effectRef idx="2">
+                <a:schemeClr val="accent1"/>
+              </a:effectRef>
+              <a:fontRef idx="minor">
+                <a:schemeClr val="lt1"/>
+              </a:fontRef>
+            </p:style>
+            <p:txBody>
+              <a:bodyPr rtlCol="0" anchor="ctr"/>
+              <a:lstStyle/>
+              <a:p>
+                <a:pPr algn="ctr"/>
+                <a:endParaRPr lang="en-US"/>
+              </a:p>
+            </p:txBody>
+          </p:sp>
+          <p:cxnSp>
+            <p:nvCxnSpPr>
+              <p:cNvPr id="29" name="Straight Connector 28"/>
+              <p:cNvCxnSpPr>
+                <a:stCxn id="28" idx="0"/>
+                <a:endCxn id="28" idx="2"/>
+              </p:cNvCxnSpPr>
+              <p:nvPr/>
+            </p:nvCxnSpPr>
+            <p:spPr>
+              <a:xfrm>
+                <a:off x="1428701" y="2063799"/>
+                <a:ext cx="0" cy="382304"/>
+              </a:xfrm>
+              <a:prstGeom prst="line">
+                <a:avLst/>
+              </a:prstGeom>
+              <a:ln w="3175" cmpd="sng">
+                <a:solidFill>
+                  <a:schemeClr val="tx1"/>
+                </a:solidFill>
+                <a:prstDash val="dash"/>
+              </a:ln>
+            </p:spPr>
+            <p:style>
+              <a:lnRef idx="2">
+                <a:schemeClr val="accent1"/>
+              </a:lnRef>
+              <a:fillRef idx="0">
+                <a:schemeClr val="accent1"/>
+              </a:fillRef>
+              <a:effectRef idx="1">
+                <a:schemeClr val="accent1"/>
+              </a:effectRef>
+              <a:fontRef idx="minor">
+                <a:schemeClr val="tx1"/>
+              </a:fontRef>
+            </p:style>
+          </p:cxnSp>
+        </p:grpSp>
+        <p:sp>
+          <p:nvSpPr>
+            <p:cNvPr id="26" name="TextBox 25"/>
+            <p:cNvSpPr txBox="1"/>
+            <p:nvPr/>
+          </p:nvSpPr>
+          <p:spPr>
+            <a:xfrm>
+              <a:off x="2044812" y="1806631"/>
+              <a:ext cx="278610" cy="276999"/>
+            </a:xfrm>
+            <a:prstGeom prst="rect">
+              <a:avLst/>
+            </a:prstGeom>
+            <a:noFill/>
+          </p:spPr>
+          <p:txBody>
+            <a:bodyPr wrap="square" rtlCol="0">
+              <a:spAutoFit/>
+            </a:bodyPr>
+            <a:lstStyle/>
+            <a:p>
+              <a:r>
+                <a:rPr lang="en-US" sz="1200" i="1" dirty="0" smtClean="0">
+                  <a:latin typeface="Microsoft Sans Serif"/>
+                  <a:cs typeface="Microsoft Sans Serif"/>
+                </a:rPr>
+                <a:t>f</a:t>
+              </a:r>
+              <a:r>
+                <a:rPr lang="en-US" sz="1200" baseline="-25000" dirty="0">
+                  <a:latin typeface="Microsoft Sans Serif"/>
+                  <a:cs typeface="Microsoft Sans Serif"/>
+                </a:rPr>
+                <a:t>3</a:t>
+              </a:r>
+            </a:p>
+          </p:txBody>
+        </p:sp>
+        <p:sp>
+          <p:nvSpPr>
+            <p:cNvPr id="27" name="TextBox 26"/>
+            <p:cNvSpPr txBox="1"/>
+            <p:nvPr/>
+          </p:nvSpPr>
+          <p:spPr>
+            <a:xfrm>
+              <a:off x="2014110" y="1271965"/>
+              <a:ext cx="340017" cy="276999"/>
+            </a:xfrm>
+            <a:prstGeom prst="rect">
+              <a:avLst/>
+            </a:prstGeom>
+            <a:noFill/>
+          </p:spPr>
+          <p:txBody>
+            <a:bodyPr wrap="square" rtlCol="0">
+              <a:spAutoFit/>
+            </a:bodyPr>
+            <a:lstStyle/>
+            <a:p>
+              <a:r>
+                <a:rPr lang="en-US" sz="1200" i="1" dirty="0" smtClean="0">
+                  <a:latin typeface="Microsoft Sans Serif"/>
+                  <a:cs typeface="Microsoft Sans Serif"/>
+                </a:rPr>
+                <a:t>S</a:t>
+              </a:r>
+              <a:r>
+                <a:rPr lang="en-US" sz="1200" baseline="-25000" dirty="0">
+                  <a:latin typeface="Microsoft Sans Serif"/>
+                  <a:cs typeface="Microsoft Sans Serif"/>
+                </a:rPr>
+                <a:t>3</a:t>
+              </a:r>
+            </a:p>
+          </p:txBody>
+        </p:sp>
+      </p:grpSp>
+      <p:sp>
+        <p:nvSpPr>
+          <p:cNvPr id="31" name="TextBox 30"/>
+          <p:cNvSpPr txBox="1"/>
+          <p:nvPr/>
+        </p:nvSpPr>
+        <p:spPr>
+          <a:xfrm>
+            <a:off x="338343" y="544895"/>
+            <a:ext cx="1887602" cy="276999"/>
+          </a:xfrm>
+          <a:prstGeom prst="rect">
+            <a:avLst/>
+          </a:prstGeom>
+          <a:noFill/>
+        </p:spPr>
+        <p:txBody>
+          <a:bodyPr wrap="square" rtlCol="0">
+            <a:spAutoFit/>
+          </a:bodyPr>
+          <a:lstStyle/>
+          <a:p>
+            <a:r>
+              <a:rPr lang="en-US" sz="1200" i="1" dirty="0" smtClean="0">
+                <a:latin typeface="Microsoft Sans Serif"/>
+                <a:cs typeface="Microsoft Sans Serif"/>
+              </a:rPr>
+              <a:t>S</a:t>
+            </a:r>
+            <a:r>
+              <a:rPr lang="en-US" sz="1200" dirty="0" smtClean="0">
+                <a:latin typeface="Microsoft Sans Serif"/>
+                <a:cs typeface="Microsoft Sans Serif"/>
+              </a:rPr>
+              <a:t>(</a:t>
+            </a:r>
+            <a:r>
+              <a:rPr lang="en-US" sz="1200" i="1" dirty="0" smtClean="0">
+                <a:latin typeface="Microsoft Sans Serif"/>
+                <a:cs typeface="Microsoft Sans Serif"/>
+              </a:rPr>
+              <a:t>t </a:t>
+            </a:r>
+            <a:r>
+              <a:rPr lang="en-US" sz="1200" dirty="0" smtClean="0">
+                <a:latin typeface="Microsoft Sans Serif"/>
+                <a:cs typeface="Microsoft Sans Serif"/>
+              </a:rPr>
+              <a:t>) = </a:t>
+            </a:r>
+            <a:r>
+              <a:rPr lang="en-US" sz="1200" i="1" dirty="0" smtClean="0">
+                <a:latin typeface="Microsoft Sans Serif"/>
+                <a:cs typeface="Microsoft Sans Serif"/>
+              </a:rPr>
+              <a:t>S</a:t>
+            </a:r>
+            <a:r>
+              <a:rPr lang="en-US" sz="1200" baseline="-25000" dirty="0" smtClean="0">
+                <a:latin typeface="Microsoft Sans Serif"/>
+                <a:cs typeface="Microsoft Sans Serif"/>
+              </a:rPr>
+              <a:t>1</a:t>
+            </a:r>
+            <a:r>
+              <a:rPr lang="en-US" sz="1200" dirty="0" smtClean="0">
+                <a:latin typeface="Microsoft Sans Serif"/>
+                <a:cs typeface="Microsoft Sans Serif"/>
+              </a:rPr>
+              <a:t>(</a:t>
+            </a:r>
+            <a:r>
+              <a:rPr lang="en-US" sz="1200" i="1" dirty="0" smtClean="0">
+                <a:latin typeface="Microsoft Sans Serif"/>
+                <a:cs typeface="Microsoft Sans Serif"/>
+              </a:rPr>
+              <a:t>t </a:t>
+            </a:r>
+            <a:r>
+              <a:rPr lang="en-US" sz="1200" dirty="0" smtClean="0">
+                <a:latin typeface="Microsoft Sans Serif"/>
+                <a:cs typeface="Microsoft Sans Serif"/>
+              </a:rPr>
+              <a:t>)+</a:t>
+            </a:r>
+            <a:r>
+              <a:rPr lang="en-US" sz="1200" i="1" dirty="0" smtClean="0">
+                <a:latin typeface="Microsoft Sans Serif"/>
+                <a:cs typeface="Microsoft Sans Serif"/>
+              </a:rPr>
+              <a:t>S</a:t>
+            </a:r>
+            <a:r>
+              <a:rPr lang="en-US" sz="1200" baseline="-25000" dirty="0" smtClean="0">
+                <a:latin typeface="Microsoft Sans Serif"/>
+                <a:cs typeface="Microsoft Sans Serif"/>
+              </a:rPr>
+              <a:t>2</a:t>
+            </a:r>
+            <a:r>
+              <a:rPr lang="en-US" sz="1200" dirty="0" smtClean="0">
+                <a:latin typeface="Microsoft Sans Serif"/>
+                <a:cs typeface="Microsoft Sans Serif"/>
+              </a:rPr>
+              <a:t>(</a:t>
+            </a:r>
+            <a:r>
+              <a:rPr lang="en-US" sz="1200" i="1" dirty="0" smtClean="0">
+                <a:latin typeface="Microsoft Sans Serif"/>
+                <a:cs typeface="Microsoft Sans Serif"/>
+              </a:rPr>
+              <a:t>t </a:t>
+            </a:r>
+            <a:r>
+              <a:rPr lang="en-US" sz="1200" dirty="0" smtClean="0">
+                <a:latin typeface="Microsoft Sans Serif"/>
+                <a:cs typeface="Microsoft Sans Serif"/>
+              </a:rPr>
+              <a:t>)+</a:t>
+            </a:r>
+            <a:r>
+              <a:rPr lang="en-US" sz="1200" i="1" dirty="0" smtClean="0">
+                <a:latin typeface="Microsoft Sans Serif"/>
+                <a:cs typeface="Microsoft Sans Serif"/>
+              </a:rPr>
+              <a:t>S</a:t>
+            </a:r>
+            <a:r>
+              <a:rPr lang="en-US" sz="1200" baseline="-25000" dirty="0" smtClean="0">
+                <a:latin typeface="Microsoft Sans Serif"/>
+                <a:cs typeface="Microsoft Sans Serif"/>
+              </a:rPr>
+              <a:t>3</a:t>
+            </a:r>
+            <a:r>
+              <a:rPr lang="en-US" sz="1200" dirty="0" smtClean="0">
+                <a:latin typeface="Microsoft Sans Serif"/>
+                <a:cs typeface="Microsoft Sans Serif"/>
+              </a:rPr>
+              <a:t>(</a:t>
+            </a:r>
+            <a:r>
+              <a:rPr lang="en-US" sz="1200" i="1" dirty="0" smtClean="0">
+                <a:latin typeface="Microsoft Sans Serif"/>
+                <a:cs typeface="Microsoft Sans Serif"/>
+              </a:rPr>
+              <a:t>t </a:t>
+            </a:r>
+            <a:r>
+              <a:rPr lang="en-US" sz="1200" dirty="0" smtClean="0">
+                <a:latin typeface="Microsoft Sans Serif"/>
+                <a:cs typeface="Microsoft Sans Serif"/>
+              </a:rPr>
+              <a:t>)</a:t>
+            </a:r>
+            <a:endParaRPr lang="en-US" sz="1200" baseline="-25000" dirty="0">
+              <a:latin typeface="Microsoft Sans Serif"/>
+              <a:cs typeface="Microsoft Sans Serif"/>
+            </a:endParaRPr>
+          </a:p>
+        </p:txBody>
+      </p:sp>
+      <p:grpSp>
+        <p:nvGrpSpPr>
+          <p:cNvPr id="41" name="Group 40"/>
+          <p:cNvGrpSpPr/>
+          <p:nvPr/>
+        </p:nvGrpSpPr>
+        <p:grpSpPr>
+          <a:xfrm>
+            <a:off x="3423069" y="1001803"/>
+            <a:ext cx="956034" cy="276999"/>
+            <a:chOff x="4210326" y="1796520"/>
+            <a:chExt cx="956034" cy="369332"/>
+          </a:xfrm>
+        </p:grpSpPr>
+        <p:sp>
+          <p:nvSpPr>
+            <p:cNvPr id="32" name="TextBox 31"/>
+            <p:cNvSpPr txBox="1"/>
+            <p:nvPr/>
+          </p:nvSpPr>
+          <p:spPr>
+            <a:xfrm>
+              <a:off x="4210326" y="1796520"/>
+              <a:ext cx="390022" cy="369332"/>
+            </a:xfrm>
+            <a:prstGeom prst="rect">
+              <a:avLst/>
+            </a:prstGeom>
+            <a:noFill/>
+          </p:spPr>
+          <p:txBody>
+            <a:bodyPr wrap="square" rtlCol="0">
+              <a:spAutoFit/>
+            </a:bodyPr>
+            <a:lstStyle/>
+            <a:p>
+              <a:r>
+                <a:rPr lang="en-US" sz="1200" i="1" dirty="0" smtClean="0">
+                  <a:latin typeface="Microsoft Sans Serif"/>
+                  <a:cs typeface="Microsoft Sans Serif"/>
+                </a:rPr>
+                <a:t>S</a:t>
+              </a:r>
+              <a:r>
+                <a:rPr lang="en-US" sz="1200" baseline="-25000" dirty="0" smtClean="0">
+                  <a:latin typeface="Microsoft Sans Serif"/>
+                  <a:cs typeface="Microsoft Sans Serif"/>
+                </a:rPr>
+                <a:t>1</a:t>
+              </a:r>
+              <a:r>
+                <a:rPr lang="en-US" sz="1200" dirty="0" smtClean="0">
+                  <a:latin typeface="Microsoft Sans Serif"/>
+                  <a:cs typeface="Microsoft Sans Serif"/>
+                </a:rPr>
+                <a:t>:</a:t>
+              </a:r>
+              <a:endParaRPr lang="en-US" sz="1200" dirty="0">
+                <a:latin typeface="Microsoft Sans Serif"/>
+                <a:cs typeface="Microsoft Sans Serif"/>
+              </a:endParaRPr>
+            </a:p>
+          </p:txBody>
+        </p:sp>
+        <p:sp>
+          <p:nvSpPr>
+            <p:cNvPr id="36" name="Freeform 35"/>
+            <p:cNvSpPr/>
+            <p:nvPr/>
+          </p:nvSpPr>
+          <p:spPr>
+            <a:xfrm>
+              <a:off x="4684727" y="1827616"/>
+              <a:ext cx="481633" cy="214809"/>
+            </a:xfrm>
+            <a:custGeom>
+              <a:avLst/>
+              <a:gdLst>
+                <a:gd name="connsiteX0" fmla="*/ 0 w 397401"/>
+                <a:gd name="connsiteY0" fmla="*/ 105784 h 301153"/>
+                <a:gd name="connsiteX1" fmla="*/ 71273 w 397401"/>
+                <a:gd name="connsiteY1" fmla="*/ 164101 h 301153"/>
+                <a:gd name="connsiteX2" fmla="*/ 136067 w 397401"/>
+                <a:gd name="connsiteY2" fmla="*/ 2108 h 301153"/>
+                <a:gd name="connsiteX3" fmla="*/ 213819 w 397401"/>
+                <a:gd name="connsiteY3" fmla="*/ 300176 h 301153"/>
+                <a:gd name="connsiteX4" fmla="*/ 272133 w 397401"/>
+                <a:gd name="connsiteY4" fmla="*/ 99304 h 301153"/>
+                <a:gd name="connsiteX5" fmla="*/ 388762 w 397401"/>
+                <a:gd name="connsiteY5" fmla="*/ 138182 h 301153"/>
+                <a:gd name="connsiteX6" fmla="*/ 388762 w 397401"/>
+                <a:gd name="connsiteY6" fmla="*/ 144662 h 301153"/>
+              </a:gdLst>
+              <a:ahLst/>
+              <a:cxnLst>
+                <a:cxn ang="0">
+                  <a:pos x="connsiteX0" y="connsiteY0"/>
+                </a:cxn>
+                <a:cxn ang="0">
+                  <a:pos x="connsiteX1" y="connsiteY1"/>
+                </a:cxn>
+                <a:cxn ang="0">
+                  <a:pos x="connsiteX2" y="connsiteY2"/>
+                </a:cxn>
+                <a:cxn ang="0">
+                  <a:pos x="connsiteX3" y="connsiteY3"/>
+                </a:cxn>
+                <a:cxn ang="0">
+                  <a:pos x="connsiteX4" y="connsiteY4"/>
+                </a:cxn>
+                <a:cxn ang="0">
+                  <a:pos x="connsiteX5" y="connsiteY5"/>
+                </a:cxn>
+                <a:cxn ang="0">
+                  <a:pos x="connsiteX6" y="connsiteY6"/>
+                </a:cxn>
+              </a:cxnLst>
+              <a:rect l="l" t="t" r="r" b="b"/>
+              <a:pathLst>
+                <a:path w="397401" h="301153">
+                  <a:moveTo>
+                    <a:pt x="0" y="105784"/>
+                  </a:moveTo>
+                  <a:cubicBezTo>
+                    <a:pt x="24297" y="143582"/>
+                    <a:pt x="48595" y="181380"/>
+                    <a:pt x="71273" y="164101"/>
+                  </a:cubicBezTo>
+                  <a:cubicBezTo>
+                    <a:pt x="93951" y="146822"/>
+                    <a:pt x="112309" y="-20571"/>
+                    <a:pt x="136067" y="2108"/>
+                  </a:cubicBezTo>
+                  <a:cubicBezTo>
+                    <a:pt x="159825" y="24787"/>
+                    <a:pt x="191141" y="283977"/>
+                    <a:pt x="213819" y="300176"/>
+                  </a:cubicBezTo>
+                  <a:cubicBezTo>
+                    <a:pt x="236497" y="316375"/>
+                    <a:pt x="242976" y="126303"/>
+                    <a:pt x="272133" y="99304"/>
+                  </a:cubicBezTo>
+                  <a:cubicBezTo>
+                    <a:pt x="301290" y="72305"/>
+                    <a:pt x="369324" y="130622"/>
+                    <a:pt x="388762" y="138182"/>
+                  </a:cubicBezTo>
+                  <a:cubicBezTo>
+                    <a:pt x="408200" y="145742"/>
+                    <a:pt x="388762" y="144662"/>
+                    <a:pt x="388762" y="144662"/>
+                  </a:cubicBezTo>
+                </a:path>
+              </a:pathLst>
+            </a:custGeom>
+            <a:ln>
+              <a:solidFill>
+                <a:schemeClr val="accent6">
+                  <a:lumMod val="50000"/>
+                </a:schemeClr>
+              </a:solidFill>
+            </a:ln>
+            <a:effectLst/>
+          </p:spPr>
+          <p:style>
+            <a:lnRef idx="2">
+              <a:schemeClr val="accent1"/>
+            </a:lnRef>
+            <a:fillRef idx="0">
+              <a:schemeClr val="accent1"/>
+            </a:fillRef>
+            <a:effectRef idx="1">
+              <a:schemeClr val="accent1"/>
+            </a:effectRef>
+            <a:fontRef idx="minor">
+              <a:schemeClr val="tx1"/>
+            </a:fontRef>
+          </p:style>
+          <p:txBody>
+            <a:bodyPr rtlCol="0" anchor="ctr"/>
+            <a:lstStyle/>
+            <a:p>
+              <a:pPr algn="ctr"/>
+              <a:endParaRPr lang="en-US"/>
+            </a:p>
+          </p:txBody>
+        </p:sp>
+      </p:grpSp>
+      <p:sp>
+        <p:nvSpPr>
+          <p:cNvPr id="37" name="TextBox 36"/>
+          <p:cNvSpPr txBox="1"/>
+          <p:nvPr/>
+        </p:nvSpPr>
+        <p:spPr>
+          <a:xfrm>
+            <a:off x="3423069" y="1281383"/>
+            <a:ext cx="390022" cy="276999"/>
+          </a:xfrm>
+          <a:prstGeom prst="rect">
+            <a:avLst/>
+          </a:prstGeom>
+          <a:noFill/>
+        </p:spPr>
+        <p:txBody>
+          <a:bodyPr wrap="square" rtlCol="0">
+            <a:spAutoFit/>
+          </a:bodyPr>
+          <a:lstStyle/>
+          <a:p>
+            <a:r>
+              <a:rPr lang="en-US" sz="1200" i="1" dirty="0" smtClean="0">
+                <a:latin typeface="Microsoft Sans Serif"/>
+                <a:cs typeface="Microsoft Sans Serif"/>
+              </a:rPr>
+              <a:t>S</a:t>
+            </a:r>
+            <a:r>
+              <a:rPr lang="en-US" sz="1200" baseline="-25000" dirty="0">
+                <a:latin typeface="Microsoft Sans Serif"/>
+                <a:cs typeface="Microsoft Sans Serif"/>
+              </a:rPr>
+              <a:t>2</a:t>
+            </a:r>
+            <a:r>
+              <a:rPr lang="en-US" sz="1200" dirty="0" smtClean="0">
+                <a:latin typeface="Microsoft Sans Serif"/>
+                <a:cs typeface="Microsoft Sans Serif"/>
+              </a:rPr>
+              <a:t>:</a:t>
+            </a:r>
+            <a:endParaRPr lang="en-US" sz="1200" dirty="0">
+              <a:latin typeface="Microsoft Sans Serif"/>
+              <a:cs typeface="Microsoft Sans Serif"/>
+            </a:endParaRPr>
+          </a:p>
+        </p:txBody>
+      </p:sp>
+      <p:sp>
+        <p:nvSpPr>
+          <p:cNvPr id="39" name="Freeform 38"/>
+          <p:cNvSpPr/>
+          <p:nvPr/>
+        </p:nvSpPr>
+        <p:spPr>
+          <a:xfrm>
+            <a:off x="3892072" y="1320080"/>
+            <a:ext cx="492431" cy="130354"/>
+          </a:xfrm>
+          <a:custGeom>
+            <a:avLst/>
+            <a:gdLst>
+              <a:gd name="connsiteX0" fmla="*/ 0 w 492431"/>
+              <a:gd name="connsiteY0" fmla="*/ 50092 h 173805"/>
+              <a:gd name="connsiteX1" fmla="*/ 200860 w 492431"/>
+              <a:gd name="connsiteY1" fmla="*/ 173207 h 173805"/>
+              <a:gd name="connsiteX2" fmla="*/ 336927 w 492431"/>
+              <a:gd name="connsiteY2" fmla="*/ 4734 h 173805"/>
+              <a:gd name="connsiteX3" fmla="*/ 492431 w 492431"/>
+              <a:gd name="connsiteY3" fmla="*/ 63052 h 173805"/>
+            </a:gdLst>
+            <a:ahLst/>
+            <a:cxnLst>
+              <a:cxn ang="0">
+                <a:pos x="connsiteX0" y="connsiteY0"/>
+              </a:cxn>
+              <a:cxn ang="0">
+                <a:pos x="connsiteX1" y="connsiteY1"/>
+              </a:cxn>
+              <a:cxn ang="0">
+                <a:pos x="connsiteX2" y="connsiteY2"/>
+              </a:cxn>
+              <a:cxn ang="0">
+                <a:pos x="connsiteX3" y="connsiteY3"/>
+              </a:cxn>
+            </a:cxnLst>
+            <a:rect l="l" t="t" r="r" b="b"/>
+            <a:pathLst>
+              <a:path w="492431" h="173805">
+                <a:moveTo>
+                  <a:pt x="0" y="50092"/>
+                </a:moveTo>
+                <a:cubicBezTo>
+                  <a:pt x="72353" y="115429"/>
+                  <a:pt x="144706" y="180767"/>
+                  <a:pt x="200860" y="173207"/>
+                </a:cubicBezTo>
+                <a:cubicBezTo>
+                  <a:pt x="257014" y="165647"/>
+                  <a:pt x="288332" y="23093"/>
+                  <a:pt x="336927" y="4734"/>
+                </a:cubicBezTo>
+                <a:cubicBezTo>
+                  <a:pt x="385522" y="-13625"/>
+                  <a:pt x="438976" y="24713"/>
+                  <a:pt x="492431" y="63052"/>
+                </a:cubicBezTo>
+              </a:path>
+            </a:pathLst>
+          </a:custGeom>
+          <a:ln>
+            <a:solidFill>
+              <a:schemeClr val="accent6">
+                <a:lumMod val="50000"/>
+              </a:schemeClr>
+            </a:solidFill>
+          </a:ln>
+          <a:effectLst/>
+        </p:spPr>
+        <p:style>
+          <a:lnRef idx="2">
+            <a:schemeClr val="accent1"/>
+          </a:lnRef>
+          <a:fillRef idx="0">
+            <a:schemeClr val="accent1"/>
+          </a:fillRef>
+          <a:effectRef idx="1">
+            <a:schemeClr val="accent1"/>
+          </a:effectRef>
+          <a:fontRef idx="minor">
+            <a:schemeClr val="tx1"/>
+          </a:fontRef>
+        </p:style>
+        <p:txBody>
+          <a:bodyPr rtlCol="0" anchor="ctr"/>
+          <a:lstStyle/>
+          <a:p>
+            <a:pPr algn="ctr"/>
+            <a:endParaRPr lang="en-US"/>
+          </a:p>
+        </p:txBody>
+      </p:sp>
+      <p:sp>
+        <p:nvSpPr>
+          <p:cNvPr id="38" name="Freeform 37"/>
+          <p:cNvSpPr/>
+          <p:nvPr/>
+        </p:nvSpPr>
+        <p:spPr>
+          <a:xfrm>
+            <a:off x="3900562" y="1560964"/>
+            <a:ext cx="475451" cy="217667"/>
+          </a:xfrm>
+          <a:custGeom>
+            <a:avLst/>
+            <a:gdLst>
+              <a:gd name="connsiteX0" fmla="*/ 0 w 475451"/>
+              <a:gd name="connsiteY0" fmla="*/ 10036 h 348841"/>
+              <a:gd name="connsiteX1" fmla="*/ 77753 w 475451"/>
+              <a:gd name="connsiteY1" fmla="*/ 346982 h 348841"/>
+              <a:gd name="connsiteX2" fmla="*/ 116629 w 475451"/>
+              <a:gd name="connsiteY2" fmla="*/ 152590 h 348841"/>
+              <a:gd name="connsiteX3" fmla="*/ 194381 w 475451"/>
+              <a:gd name="connsiteY3" fmla="*/ 308104 h 348841"/>
+              <a:gd name="connsiteX4" fmla="*/ 226778 w 475451"/>
+              <a:gd name="connsiteY4" fmla="*/ 3556 h 348841"/>
+              <a:gd name="connsiteX5" fmla="*/ 265654 w 475451"/>
+              <a:gd name="connsiteY5" fmla="*/ 139630 h 348841"/>
+              <a:gd name="connsiteX6" fmla="*/ 349886 w 475451"/>
+              <a:gd name="connsiteY6" fmla="*/ 107232 h 348841"/>
+              <a:gd name="connsiteX7" fmla="*/ 382283 w 475451"/>
+              <a:gd name="connsiteY7" fmla="*/ 204428 h 348841"/>
+              <a:gd name="connsiteX8" fmla="*/ 466515 w 475451"/>
+              <a:gd name="connsiteY8" fmla="*/ 230347 h 348841"/>
+              <a:gd name="connsiteX9" fmla="*/ 472994 w 475451"/>
+              <a:gd name="connsiteY9" fmla="*/ 230347 h 348841"/>
+            </a:gdLst>
+            <a:ahLst/>
+            <a:cxnLst>
+              <a:cxn ang="0">
+                <a:pos x="connsiteX0" y="connsiteY0"/>
+              </a:cxn>
+              <a:cxn ang="0">
+                <a:pos x="connsiteX1" y="connsiteY1"/>
+              </a:cxn>
+              <a:cxn ang="0">
+                <a:pos x="connsiteX2" y="connsiteY2"/>
+              </a:cxn>
+              <a:cxn ang="0">
+                <a:pos x="connsiteX3" y="connsiteY3"/>
+              </a:cxn>
+              <a:cxn ang="0">
+                <a:pos x="connsiteX4" y="connsiteY4"/>
+              </a:cxn>
+              <a:cxn ang="0">
+                <a:pos x="connsiteX5" y="connsiteY5"/>
+              </a:cxn>
+              <a:cxn ang="0">
+                <a:pos x="connsiteX6" y="connsiteY6"/>
+              </a:cxn>
+              <a:cxn ang="0">
+                <a:pos x="connsiteX7" y="connsiteY7"/>
+              </a:cxn>
+              <a:cxn ang="0">
+                <a:pos x="connsiteX8" y="connsiteY8"/>
+              </a:cxn>
+              <a:cxn ang="0">
+                <a:pos x="connsiteX9" y="connsiteY9"/>
+              </a:cxn>
+            </a:cxnLst>
+            <a:rect l="l" t="t" r="r" b="b"/>
+            <a:pathLst>
+              <a:path w="475451" h="348841">
+                <a:moveTo>
+                  <a:pt x="0" y="10036"/>
+                </a:moveTo>
+                <a:cubicBezTo>
+                  <a:pt x="29157" y="166629"/>
+                  <a:pt x="58315" y="323223"/>
+                  <a:pt x="77753" y="346982"/>
+                </a:cubicBezTo>
+                <a:cubicBezTo>
+                  <a:pt x="97191" y="370741"/>
+                  <a:pt x="97191" y="159070"/>
+                  <a:pt x="116629" y="152590"/>
+                </a:cubicBezTo>
+                <a:cubicBezTo>
+                  <a:pt x="136067" y="146110"/>
+                  <a:pt x="176023" y="332943"/>
+                  <a:pt x="194381" y="308104"/>
+                </a:cubicBezTo>
+                <a:cubicBezTo>
+                  <a:pt x="212739" y="283265"/>
+                  <a:pt x="214899" y="31635"/>
+                  <a:pt x="226778" y="3556"/>
+                </a:cubicBezTo>
+                <a:cubicBezTo>
+                  <a:pt x="238657" y="-24523"/>
+                  <a:pt x="245136" y="122351"/>
+                  <a:pt x="265654" y="139630"/>
+                </a:cubicBezTo>
+                <a:cubicBezTo>
+                  <a:pt x="286172" y="156909"/>
+                  <a:pt x="330448" y="96432"/>
+                  <a:pt x="349886" y="107232"/>
+                </a:cubicBezTo>
+                <a:cubicBezTo>
+                  <a:pt x="369324" y="118032"/>
+                  <a:pt x="362845" y="183909"/>
+                  <a:pt x="382283" y="204428"/>
+                </a:cubicBezTo>
+                <a:cubicBezTo>
+                  <a:pt x="401721" y="224947"/>
+                  <a:pt x="451397" y="226027"/>
+                  <a:pt x="466515" y="230347"/>
+                </a:cubicBezTo>
+                <a:cubicBezTo>
+                  <a:pt x="481633" y="234667"/>
+                  <a:pt x="472994" y="230347"/>
+                  <a:pt x="472994" y="230347"/>
+                </a:cubicBezTo>
+              </a:path>
+            </a:pathLst>
+          </a:custGeom>
+          <a:ln>
+            <a:solidFill>
+              <a:schemeClr val="accent6">
+                <a:lumMod val="50000"/>
+              </a:schemeClr>
+            </a:solidFill>
+          </a:ln>
+          <a:effectLst/>
+        </p:spPr>
+        <p:style>
+          <a:lnRef idx="2">
+            <a:schemeClr val="accent1"/>
+          </a:lnRef>
+          <a:fillRef idx="0">
+            <a:schemeClr val="accent1"/>
+          </a:fillRef>
+          <a:effectRef idx="1">
+            <a:schemeClr val="accent1"/>
+          </a:effectRef>
+          <a:fontRef idx="minor">
+            <a:schemeClr val="tx1"/>
+          </a:fontRef>
+        </p:style>
+        <p:txBody>
+          <a:bodyPr rtlCol="0" anchor="ctr"/>
+          <a:lstStyle/>
+          <a:p>
+            <a:pPr algn="ctr"/>
+            <a:endParaRPr lang="en-US"/>
+          </a:p>
+        </p:txBody>
+      </p:sp>
+      <p:sp>
+        <p:nvSpPr>
+          <p:cNvPr id="40" name="TextBox 39"/>
+          <p:cNvSpPr txBox="1"/>
+          <p:nvPr/>
+        </p:nvSpPr>
+        <p:spPr>
+          <a:xfrm>
+            <a:off x="3423069" y="1565923"/>
+            <a:ext cx="390022" cy="276999"/>
+          </a:xfrm>
+          <a:prstGeom prst="rect">
+            <a:avLst/>
+          </a:prstGeom>
+          <a:noFill/>
+        </p:spPr>
+        <p:txBody>
+          <a:bodyPr wrap="square" rtlCol="0">
+            <a:spAutoFit/>
+          </a:bodyPr>
+          <a:lstStyle/>
+          <a:p>
+            <a:r>
+              <a:rPr lang="en-US" sz="1200" i="1" dirty="0" smtClean="0">
+                <a:latin typeface="Microsoft Sans Serif"/>
+                <a:cs typeface="Microsoft Sans Serif"/>
+              </a:rPr>
+              <a:t>S</a:t>
+            </a:r>
+            <a:r>
+              <a:rPr lang="en-US" sz="1200" baseline="-25000" dirty="0" smtClean="0">
+                <a:latin typeface="Microsoft Sans Serif"/>
+                <a:cs typeface="Microsoft Sans Serif"/>
+              </a:rPr>
+              <a:t>3</a:t>
+            </a:r>
+            <a:r>
+              <a:rPr lang="en-US" sz="1200" dirty="0" smtClean="0">
+                <a:latin typeface="Microsoft Sans Serif"/>
+                <a:cs typeface="Microsoft Sans Serif"/>
+              </a:rPr>
+              <a:t>:</a:t>
+            </a:r>
+            <a:endParaRPr lang="en-US" sz="1200" dirty="0">
+              <a:latin typeface="Microsoft Sans Serif"/>
+              <a:cs typeface="Microsoft Sans Serif"/>
+            </a:endParaRPr>
+          </a:p>
+        </p:txBody>
+      </p:sp>
+      <p:grpSp>
+        <p:nvGrpSpPr>
+          <p:cNvPr id="48" name="Group 47"/>
+          <p:cNvGrpSpPr/>
+          <p:nvPr/>
+        </p:nvGrpSpPr>
+        <p:grpSpPr>
+          <a:xfrm>
+            <a:off x="3031375" y="510555"/>
+            <a:ext cx="1479103" cy="400110"/>
+            <a:chOff x="3644557" y="1267765"/>
+            <a:chExt cx="1479103" cy="533479"/>
+          </a:xfrm>
+        </p:grpSpPr>
+        <p:sp>
+          <p:nvSpPr>
+            <p:cNvPr id="45" name="TextBox 44"/>
+            <p:cNvSpPr txBox="1"/>
+            <p:nvPr/>
+          </p:nvSpPr>
+          <p:spPr>
+            <a:xfrm>
+              <a:off x="3644557" y="1267765"/>
+              <a:ext cx="1479103" cy="533479"/>
+            </a:xfrm>
+            <a:prstGeom prst="rect">
+              <a:avLst/>
+            </a:prstGeom>
+            <a:noFill/>
+          </p:spPr>
+          <p:txBody>
+            <a:bodyPr wrap="square" rtlCol="0">
+              <a:spAutoFit/>
+            </a:bodyPr>
+            <a:lstStyle>
+              <a:defPPr>
+                <a:defRPr lang="en-US"/>
+              </a:defPPr>
+              <a:lvl1pPr>
+                <a:defRPr sz="1200" i="1">
+                  <a:latin typeface="Microsoft Sans Serif"/>
+                  <a:cs typeface="Microsoft Sans Serif"/>
+                </a:defRPr>
+              </a:lvl1pPr>
+            </a:lstStyle>
+            <a:p>
+              <a:pPr algn="r"/>
+              <a:r>
+                <a:rPr lang="en-US" sz="1000" i="0" dirty="0"/>
+                <a:t>Power Envelope </a:t>
+              </a:r>
+            </a:p>
+            <a:p>
+              <a:pPr algn="r"/>
+              <a:r>
+                <a:rPr lang="en-US" sz="1000" i="0" dirty="0"/>
+                <a:t>o</a:t>
+              </a:r>
+              <a:r>
+                <a:rPr lang="en-US" sz="1000" i="0" dirty="0" smtClean="0"/>
+                <a:t>f Individual Segment</a:t>
+              </a:r>
+            </a:p>
+          </p:txBody>
+        </p:sp>
+        <p:cxnSp>
+          <p:nvCxnSpPr>
+            <p:cNvPr id="47" name="Straight Connector 46"/>
+            <p:cNvCxnSpPr/>
+            <p:nvPr/>
+          </p:nvCxnSpPr>
+          <p:spPr>
+            <a:xfrm flipV="1">
+              <a:off x="3748349" y="1787822"/>
+              <a:ext cx="1286620" cy="1"/>
+            </a:xfrm>
+            <a:prstGeom prst="line">
+              <a:avLst/>
+            </a:prstGeom>
+            <a:ln w="9525" cmpd="sng">
+              <a:solidFill>
+                <a:schemeClr val="tx1"/>
+              </a:solidFill>
+              <a:tailEnd type="none"/>
+            </a:ln>
+            <a:effectLst/>
+          </p:spPr>
+          <p:style>
+            <a:lnRef idx="2">
+              <a:schemeClr val="accent1"/>
+            </a:lnRef>
+            <a:fillRef idx="0">
+              <a:schemeClr val="accent1"/>
+            </a:fillRef>
+            <a:effectRef idx="1">
+              <a:schemeClr val="accent1"/>
+            </a:effectRef>
+            <a:fontRef idx="minor">
+              <a:schemeClr val="tx1"/>
+            </a:fontRef>
+          </p:style>
+        </p:cxnSp>
+      </p:grpSp>
+      <p:sp>
+        <p:nvSpPr>
+          <p:cNvPr id="49" name="Right Brace 48"/>
+          <p:cNvSpPr/>
+          <p:nvPr/>
+        </p:nvSpPr>
+        <p:spPr>
+          <a:xfrm>
+            <a:off x="4461033" y="1054282"/>
+            <a:ext cx="123107" cy="694707"/>
+          </a:xfrm>
+          <a:prstGeom prst="rightBrace">
+            <a:avLst/>
+          </a:prstGeom>
+          <a:ln w="9525" cmpd="sng">
+            <a:solidFill>
+              <a:schemeClr val="tx1"/>
+            </a:solidFill>
+            <a:tailEnd type="none"/>
+          </a:ln>
+          <a:effectLst/>
+        </p:spPr>
+        <p:style>
+          <a:lnRef idx="2">
+            <a:schemeClr val="accent1"/>
+          </a:lnRef>
+          <a:fillRef idx="0">
+            <a:schemeClr val="accent1"/>
+          </a:fillRef>
+          <a:effectRef idx="1">
+            <a:schemeClr val="accent1"/>
+          </a:effectRef>
+          <a:fontRef idx="minor">
+            <a:schemeClr val="tx1"/>
+          </a:fontRef>
+        </p:style>
+        <p:txBody>
+          <a:bodyPr rtlCol="0" anchor="ctr"/>
+          <a:lstStyle/>
+          <a:p>
+            <a:pPr algn="ctr"/>
+            <a:endParaRPr lang="en-US"/>
+          </a:p>
+        </p:txBody>
+      </p:sp>
+      <p:sp>
+        <p:nvSpPr>
+          <p:cNvPr id="50" name="Plus 49"/>
+          <p:cNvSpPr/>
+          <p:nvPr/>
+        </p:nvSpPr>
+        <p:spPr>
+          <a:xfrm>
+            <a:off x="4606776" y="1318264"/>
+            <a:ext cx="161984" cy="166742"/>
+          </a:xfrm>
+          <a:prstGeom prst="mathPlus">
+            <a:avLst/>
+          </a:prstGeom>
+          <a:solidFill>
+            <a:schemeClr val="tx1"/>
+          </a:solidFill>
+          <a:ln w="9525" cmpd="sng">
+            <a:solidFill>
+              <a:schemeClr val="tx1"/>
+            </a:solidFill>
+            <a:tailEnd type="none"/>
+          </a:ln>
+          <a:effectLst/>
+        </p:spPr>
+        <p:style>
+          <a:lnRef idx="2">
+            <a:schemeClr val="accent1"/>
+          </a:lnRef>
+          <a:fillRef idx="0">
+            <a:schemeClr val="accent1"/>
+          </a:fillRef>
+          <a:effectRef idx="1">
+            <a:schemeClr val="accent1"/>
+          </a:effectRef>
+          <a:fontRef idx="minor">
+            <a:schemeClr val="tx1"/>
+          </a:fontRef>
+        </p:style>
+        <p:txBody>
+          <a:bodyPr rtlCol="0" anchor="ctr"/>
+          <a:lstStyle/>
+          <a:p>
+            <a:pPr algn="ctr"/>
+            <a:endParaRPr lang="en-US">
+              <a:solidFill>
+                <a:schemeClr val="tx1"/>
+              </a:solidFill>
+            </a:endParaRPr>
+          </a:p>
+        </p:txBody>
+      </p:sp>
+      <p:sp>
+        <p:nvSpPr>
+          <p:cNvPr id="51" name="TextBox 50"/>
+          <p:cNvSpPr txBox="1"/>
+          <p:nvPr/>
+        </p:nvSpPr>
+        <p:spPr>
+          <a:xfrm>
+            <a:off x="4687819" y="1263136"/>
+            <a:ext cx="1671668" cy="276999"/>
+          </a:xfrm>
+          <a:prstGeom prst="rect">
+            <a:avLst/>
+          </a:prstGeom>
+          <a:noFill/>
+        </p:spPr>
+        <p:txBody>
+          <a:bodyPr wrap="square" rtlCol="0">
+            <a:spAutoFit/>
+          </a:bodyPr>
+          <a:lstStyle>
+            <a:defPPr>
+              <a:defRPr lang="en-US"/>
+            </a:defPPr>
+            <a:lvl1pPr>
+              <a:defRPr sz="1200" i="1">
+                <a:latin typeface="Microsoft Sans Serif"/>
+                <a:cs typeface="Microsoft Sans Serif"/>
+              </a:defRPr>
+            </a:lvl1pPr>
+          </a:lstStyle>
+          <a:p>
+            <a:pPr algn="r"/>
+            <a:r>
+              <a:rPr lang="en-US" i="0" dirty="0"/>
+              <a:t>i</a:t>
+            </a:r>
+            <a:r>
+              <a:rPr lang="en-US" i="0" dirty="0" smtClean="0"/>
+              <a:t>s the upper bound of</a:t>
+            </a:r>
+          </a:p>
+        </p:txBody>
+      </p:sp>
+      <p:sp>
+        <p:nvSpPr>
+          <p:cNvPr id="53" name="TextBox 52"/>
+          <p:cNvSpPr txBox="1"/>
+          <p:nvPr/>
+        </p:nvSpPr>
+        <p:spPr>
+          <a:xfrm>
+            <a:off x="6340025" y="1263136"/>
+            <a:ext cx="390022" cy="276999"/>
+          </a:xfrm>
+          <a:prstGeom prst="rect">
+            <a:avLst/>
+          </a:prstGeom>
+          <a:noFill/>
+        </p:spPr>
+        <p:txBody>
+          <a:bodyPr wrap="square" rtlCol="0">
+            <a:spAutoFit/>
+          </a:bodyPr>
+          <a:lstStyle/>
+          <a:p>
+            <a:r>
+              <a:rPr lang="en-US" sz="1200" i="1" dirty="0" smtClean="0">
+                <a:latin typeface="Microsoft Sans Serif"/>
+                <a:cs typeface="Microsoft Sans Serif"/>
+              </a:rPr>
+              <a:t>S</a:t>
+            </a:r>
+            <a:r>
+              <a:rPr lang="en-US" sz="1200" dirty="0" smtClean="0">
+                <a:latin typeface="Microsoft Sans Serif"/>
+                <a:cs typeface="Microsoft Sans Serif"/>
+              </a:rPr>
+              <a:t>:</a:t>
+            </a:r>
+            <a:endParaRPr lang="en-US" sz="1200" dirty="0">
+              <a:latin typeface="Microsoft Sans Serif"/>
+              <a:cs typeface="Microsoft Sans Serif"/>
+            </a:endParaRPr>
+          </a:p>
+        </p:txBody>
+      </p:sp>
+      <p:grpSp>
+        <p:nvGrpSpPr>
+          <p:cNvPr id="60" name="Group 59"/>
+          <p:cNvGrpSpPr/>
+          <p:nvPr/>
+        </p:nvGrpSpPr>
+        <p:grpSpPr>
+          <a:xfrm>
+            <a:off x="5839141" y="662952"/>
+            <a:ext cx="1394774" cy="400110"/>
+            <a:chOff x="3728886" y="1267765"/>
+            <a:chExt cx="1394774" cy="533480"/>
+          </a:xfrm>
+        </p:grpSpPr>
+        <p:sp>
+          <p:nvSpPr>
+            <p:cNvPr id="61" name="TextBox 60"/>
+            <p:cNvSpPr txBox="1"/>
+            <p:nvPr/>
+          </p:nvSpPr>
+          <p:spPr>
+            <a:xfrm>
+              <a:off x="3728886" y="1267765"/>
+              <a:ext cx="1394774" cy="533480"/>
+            </a:xfrm>
+            <a:prstGeom prst="rect">
+              <a:avLst/>
+            </a:prstGeom>
+            <a:noFill/>
+          </p:spPr>
+          <p:txBody>
+            <a:bodyPr wrap="square" rtlCol="0">
+              <a:spAutoFit/>
+            </a:bodyPr>
+            <a:lstStyle>
+              <a:defPPr>
+                <a:defRPr lang="en-US"/>
+              </a:defPPr>
+              <a:lvl1pPr>
+                <a:defRPr sz="1200" i="1">
+                  <a:latin typeface="Microsoft Sans Serif"/>
+                  <a:cs typeface="Microsoft Sans Serif"/>
+                </a:defRPr>
+              </a:lvl1pPr>
+            </a:lstStyle>
+            <a:p>
+              <a:pPr algn="r"/>
+              <a:r>
+                <a:rPr lang="en-US" sz="1000" i="0" dirty="0" smtClean="0"/>
+                <a:t>Power Envelope</a:t>
+              </a:r>
+            </a:p>
+            <a:p>
+              <a:pPr algn="r"/>
+              <a:r>
+                <a:rPr lang="en-US" sz="1000" i="0" dirty="0" smtClean="0"/>
+                <a:t>of Segments Sum</a:t>
+              </a:r>
+            </a:p>
+          </p:txBody>
+        </p:sp>
+        <p:cxnSp>
+          <p:nvCxnSpPr>
+            <p:cNvPr id="62" name="Straight Connector 61"/>
+            <p:cNvCxnSpPr/>
+            <p:nvPr/>
+          </p:nvCxnSpPr>
+          <p:spPr>
+            <a:xfrm flipV="1">
+              <a:off x="3748349" y="1787822"/>
+              <a:ext cx="1286620" cy="1"/>
+            </a:xfrm>
+            <a:prstGeom prst="line">
+              <a:avLst/>
+            </a:prstGeom>
+            <a:ln w="9525" cmpd="sng">
+              <a:solidFill>
+                <a:schemeClr val="tx1"/>
+              </a:solidFill>
+              <a:tailEnd type="none"/>
+            </a:ln>
+            <a:effectLst/>
+          </p:spPr>
+          <p:style>
+            <a:lnRef idx="2">
+              <a:schemeClr val="accent1"/>
+            </a:lnRef>
+            <a:fillRef idx="0">
+              <a:schemeClr val="accent1"/>
+            </a:fillRef>
+            <a:effectRef idx="1">
+              <a:schemeClr val="accent1"/>
+            </a:effectRef>
+            <a:fontRef idx="minor">
+              <a:schemeClr val="tx1"/>
+            </a:fontRef>
+          </p:style>
+        </p:cxnSp>
+      </p:grpSp>
+      <p:sp>
+        <p:nvSpPr>
+          <p:cNvPr id="63" name="Freeform 62"/>
+          <p:cNvSpPr/>
+          <p:nvPr/>
+        </p:nvSpPr>
+        <p:spPr>
+          <a:xfrm>
+            <a:off x="6685573" y="1245478"/>
+            <a:ext cx="457383" cy="312315"/>
+          </a:xfrm>
+          <a:custGeom>
+            <a:avLst/>
+            <a:gdLst>
+              <a:gd name="connsiteX0" fmla="*/ 0 w 457383"/>
+              <a:gd name="connsiteY0" fmla="*/ 103174 h 312315"/>
+              <a:gd name="connsiteX1" fmla="*/ 29195 w 457383"/>
+              <a:gd name="connsiteY1" fmla="*/ 258890 h 312315"/>
+              <a:gd name="connsiteX2" fmla="*/ 48658 w 457383"/>
+              <a:gd name="connsiteY2" fmla="*/ 20450 h 312315"/>
+              <a:gd name="connsiteX3" fmla="*/ 92450 w 457383"/>
+              <a:gd name="connsiteY3" fmla="*/ 151835 h 312315"/>
+              <a:gd name="connsiteX4" fmla="*/ 102181 w 457383"/>
+              <a:gd name="connsiteY4" fmla="*/ 273489 h 312315"/>
+              <a:gd name="connsiteX5" fmla="*/ 136242 w 457383"/>
+              <a:gd name="connsiteY5" fmla="*/ 302685 h 312315"/>
+              <a:gd name="connsiteX6" fmla="*/ 141108 w 457383"/>
+              <a:gd name="connsiteY6" fmla="*/ 122639 h 312315"/>
+              <a:gd name="connsiteX7" fmla="*/ 180034 w 457383"/>
+              <a:gd name="connsiteY7" fmla="*/ 219961 h 312315"/>
+              <a:gd name="connsiteX8" fmla="*/ 194631 w 457383"/>
+              <a:gd name="connsiteY8" fmla="*/ 35048 h 312315"/>
+              <a:gd name="connsiteX9" fmla="*/ 233557 w 457383"/>
+              <a:gd name="connsiteY9" fmla="*/ 132371 h 312315"/>
+              <a:gd name="connsiteX10" fmla="*/ 253020 w 457383"/>
+              <a:gd name="connsiteY10" fmla="*/ 254024 h 312315"/>
+              <a:gd name="connsiteX11" fmla="*/ 277349 w 457383"/>
+              <a:gd name="connsiteY11" fmla="*/ 985 h 312315"/>
+              <a:gd name="connsiteX12" fmla="*/ 316275 w 457383"/>
+              <a:gd name="connsiteY12" fmla="*/ 171300 h 312315"/>
+              <a:gd name="connsiteX13" fmla="*/ 360067 w 457383"/>
+              <a:gd name="connsiteY13" fmla="*/ 297819 h 312315"/>
+              <a:gd name="connsiteX14" fmla="*/ 369799 w 457383"/>
+              <a:gd name="connsiteY14" fmla="*/ 122639 h 312315"/>
+              <a:gd name="connsiteX15" fmla="*/ 423322 w 457383"/>
+              <a:gd name="connsiteY15" fmla="*/ 142103 h 312315"/>
+              <a:gd name="connsiteX16" fmla="*/ 457383 w 457383"/>
+              <a:gd name="connsiteY16" fmla="*/ 254024 h 312315"/>
+            </a:gdLst>
+            <a:ahLst/>
+            <a:cxnLst>
+              <a:cxn ang="0">
+                <a:pos x="connsiteX0" y="connsiteY0"/>
+              </a:cxn>
+              <a:cxn ang="0">
+                <a:pos x="connsiteX1" y="connsiteY1"/>
+              </a:cxn>
+              <a:cxn ang="0">
+                <a:pos x="connsiteX2" y="connsiteY2"/>
+              </a:cxn>
+              <a:cxn ang="0">
+                <a:pos x="connsiteX3" y="connsiteY3"/>
+              </a:cxn>
+              <a:cxn ang="0">
+                <a:pos x="connsiteX4" y="connsiteY4"/>
+              </a:cxn>
+              <a:cxn ang="0">
+                <a:pos x="connsiteX5" y="connsiteY5"/>
+              </a:cxn>
+              <a:cxn ang="0">
+                <a:pos x="connsiteX6" y="connsiteY6"/>
+              </a:cxn>
+              <a:cxn ang="0">
+                <a:pos x="connsiteX7" y="connsiteY7"/>
+              </a:cxn>
+              <a:cxn ang="0">
+                <a:pos x="connsiteX8" y="connsiteY8"/>
+              </a:cxn>
+              <a:cxn ang="0">
+                <a:pos x="connsiteX9" y="connsiteY9"/>
+              </a:cxn>
+              <a:cxn ang="0">
+                <a:pos x="connsiteX10" y="connsiteY10"/>
+              </a:cxn>
+              <a:cxn ang="0">
+                <a:pos x="connsiteX11" y="connsiteY11"/>
+              </a:cxn>
+              <a:cxn ang="0">
+                <a:pos x="connsiteX12" y="connsiteY12"/>
+              </a:cxn>
+              <a:cxn ang="0">
+                <a:pos x="connsiteX13" y="connsiteY13"/>
+              </a:cxn>
+              <a:cxn ang="0">
+                <a:pos x="connsiteX14" y="connsiteY14"/>
+              </a:cxn>
+              <a:cxn ang="0">
+                <a:pos x="connsiteX15" y="connsiteY15"/>
+              </a:cxn>
+              <a:cxn ang="0">
+                <a:pos x="connsiteX16" y="connsiteY16"/>
+              </a:cxn>
+            </a:cxnLst>
+            <a:rect l="l" t="t" r="r" b="b"/>
+            <a:pathLst>
+              <a:path w="457383" h="312315">
+                <a:moveTo>
+                  <a:pt x="0" y="103174"/>
+                </a:moveTo>
+                <a:cubicBezTo>
+                  <a:pt x="10542" y="187925"/>
+                  <a:pt x="21085" y="272677"/>
+                  <a:pt x="29195" y="258890"/>
+                </a:cubicBezTo>
+                <a:cubicBezTo>
+                  <a:pt x="37305" y="245103"/>
+                  <a:pt x="38116" y="38292"/>
+                  <a:pt x="48658" y="20450"/>
+                </a:cubicBezTo>
+                <a:cubicBezTo>
+                  <a:pt x="59200" y="2608"/>
+                  <a:pt x="83529" y="109662"/>
+                  <a:pt x="92450" y="151835"/>
+                </a:cubicBezTo>
+                <a:cubicBezTo>
+                  <a:pt x="101371" y="194008"/>
+                  <a:pt x="94882" y="248347"/>
+                  <a:pt x="102181" y="273489"/>
+                </a:cubicBezTo>
+                <a:cubicBezTo>
+                  <a:pt x="109480" y="298631"/>
+                  <a:pt x="129754" y="327827"/>
+                  <a:pt x="136242" y="302685"/>
+                </a:cubicBezTo>
+                <a:cubicBezTo>
+                  <a:pt x="142730" y="277543"/>
+                  <a:pt x="133809" y="136426"/>
+                  <a:pt x="141108" y="122639"/>
+                </a:cubicBezTo>
+                <a:cubicBezTo>
+                  <a:pt x="148407" y="108852"/>
+                  <a:pt x="171114" y="234559"/>
+                  <a:pt x="180034" y="219961"/>
+                </a:cubicBezTo>
+                <a:cubicBezTo>
+                  <a:pt x="188954" y="205363"/>
+                  <a:pt x="185711" y="49646"/>
+                  <a:pt x="194631" y="35048"/>
+                </a:cubicBezTo>
+                <a:cubicBezTo>
+                  <a:pt x="203551" y="20450"/>
+                  <a:pt x="223826" y="95875"/>
+                  <a:pt x="233557" y="132371"/>
+                </a:cubicBezTo>
+                <a:cubicBezTo>
+                  <a:pt x="243289" y="168867"/>
+                  <a:pt x="245721" y="275922"/>
+                  <a:pt x="253020" y="254024"/>
+                </a:cubicBezTo>
+                <a:cubicBezTo>
+                  <a:pt x="260319" y="232126"/>
+                  <a:pt x="266807" y="14772"/>
+                  <a:pt x="277349" y="985"/>
+                </a:cubicBezTo>
+                <a:cubicBezTo>
+                  <a:pt x="287892" y="-12802"/>
+                  <a:pt x="302489" y="121828"/>
+                  <a:pt x="316275" y="171300"/>
+                </a:cubicBezTo>
+                <a:cubicBezTo>
+                  <a:pt x="330061" y="220772"/>
+                  <a:pt x="351146" y="305929"/>
+                  <a:pt x="360067" y="297819"/>
+                </a:cubicBezTo>
+                <a:cubicBezTo>
+                  <a:pt x="368988" y="289709"/>
+                  <a:pt x="359257" y="148592"/>
+                  <a:pt x="369799" y="122639"/>
+                </a:cubicBezTo>
+                <a:cubicBezTo>
+                  <a:pt x="380341" y="96686"/>
+                  <a:pt x="408725" y="120205"/>
+                  <a:pt x="423322" y="142103"/>
+                </a:cubicBezTo>
+                <a:cubicBezTo>
+                  <a:pt x="437919" y="164001"/>
+                  <a:pt x="457383" y="254024"/>
+                  <a:pt x="457383" y="254024"/>
+                </a:cubicBezTo>
+              </a:path>
+            </a:pathLst>
+          </a:custGeom>
+          <a:ln>
+            <a:solidFill>
+              <a:schemeClr val="accent6">
+                <a:lumMod val="50000"/>
+              </a:schemeClr>
+            </a:solidFill>
+          </a:ln>
+          <a:effectLst/>
+        </p:spPr>
+        <p:style>
+          <a:lnRef idx="2">
+            <a:schemeClr val="accent1"/>
+          </a:lnRef>
+          <a:fillRef idx="0">
+            <a:schemeClr val="accent1"/>
+          </a:fillRef>
+          <a:effectRef idx="1">
+            <a:schemeClr val="accent1"/>
+          </a:effectRef>
+          <a:fontRef idx="minor">
+            <a:schemeClr val="tx1"/>
+          </a:fontRef>
+        </p:style>
+        <p:txBody>
+          <a:bodyPr rtlCol="0" anchor="ctr"/>
+          <a:lstStyle/>
+          <a:p>
+            <a:pPr algn="ctr"/>
+            <a:endParaRPr lang="en-US"/>
+          </a:p>
+        </p:txBody>
+      </p:sp>
+      <p:sp>
+        <p:nvSpPr>
+          <p:cNvPr id="64" name="Isosceles Triangle 63"/>
+          <p:cNvSpPr/>
+          <p:nvPr/>
+        </p:nvSpPr>
+        <p:spPr>
+          <a:xfrm rot="5400000">
+            <a:off x="7600334" y="1239294"/>
+            <a:ext cx="535235" cy="324682"/>
+          </a:xfrm>
+          <a:prstGeom prst="triangle">
+            <a:avLst/>
+          </a:prstGeom>
+          <a:solidFill>
+            <a:schemeClr val="accent3">
+              <a:lumMod val="75000"/>
+            </a:schemeClr>
+          </a:solidFill>
+          <a:effectLst/>
+        </p:spPr>
+        <p:style>
+          <a:lnRef idx="1">
+            <a:schemeClr val="accent1"/>
+          </a:lnRef>
+          <a:fillRef idx="3">
+            <a:schemeClr val="accent1"/>
+          </a:fillRef>
+          <a:effectRef idx="2">
+            <a:schemeClr val="accent1"/>
+          </a:effectRef>
+          <a:fontRef idx="minor">
+            <a:schemeClr val="lt1"/>
+          </a:fontRef>
+        </p:style>
+        <p:txBody>
+          <a:bodyPr rtlCol="0" anchor="ctr"/>
+          <a:lstStyle/>
+          <a:p>
+            <a:pPr algn="ctr"/>
+            <a:endParaRPr lang="en-US"/>
+          </a:p>
+        </p:txBody>
+      </p:sp>
+      <p:cxnSp>
+        <p:nvCxnSpPr>
+          <p:cNvPr id="66" name="Straight Arrow Connector 65"/>
+          <p:cNvCxnSpPr/>
+          <p:nvPr/>
+        </p:nvCxnSpPr>
+        <p:spPr>
+          <a:xfrm>
+            <a:off x="7186744" y="1401635"/>
+            <a:ext cx="518867" cy="0"/>
+          </a:xfrm>
+          <a:prstGeom prst="straightConnector1">
+            <a:avLst/>
+          </a:prstGeom>
+          <a:ln w="3175" cmpd="sng">
+            <a:solidFill>
+              <a:schemeClr val="tx1"/>
+            </a:solidFill>
+            <a:tailEnd type="arrow"/>
+          </a:ln>
+          <a:effectLst/>
+        </p:spPr>
+        <p:style>
+          <a:lnRef idx="2">
+            <a:schemeClr val="accent1"/>
+          </a:lnRef>
+          <a:fillRef idx="0">
+            <a:schemeClr val="accent1"/>
+          </a:fillRef>
+          <a:effectRef idx="1">
+            <a:schemeClr val="accent1"/>
+          </a:effectRef>
+          <a:fontRef idx="minor">
+            <a:schemeClr val="tx1"/>
+          </a:fontRef>
+        </p:style>
+      </p:cxnSp>
+      <p:cxnSp>
+        <p:nvCxnSpPr>
+          <p:cNvPr id="70" name="Straight Arrow Connector 69"/>
+          <p:cNvCxnSpPr/>
+          <p:nvPr/>
+        </p:nvCxnSpPr>
+        <p:spPr>
+          <a:xfrm>
+            <a:off x="8030293" y="1401635"/>
+            <a:ext cx="368028" cy="0"/>
+          </a:xfrm>
+          <a:prstGeom prst="straightConnector1">
+            <a:avLst/>
+          </a:prstGeom>
+          <a:ln w="3175" cmpd="sng">
+            <a:solidFill>
+              <a:schemeClr val="tx1"/>
+            </a:solidFill>
+            <a:tailEnd type="arrow"/>
+          </a:ln>
+          <a:effectLst/>
+        </p:spPr>
+        <p:style>
+          <a:lnRef idx="2">
+            <a:schemeClr val="accent1"/>
+          </a:lnRef>
+          <a:fillRef idx="0">
+            <a:schemeClr val="accent1"/>
+          </a:fillRef>
+          <a:effectRef idx="1">
+            <a:schemeClr val="accent1"/>
+          </a:effectRef>
+          <a:fontRef idx="minor">
+            <a:schemeClr val="tx1"/>
+          </a:fontRef>
+        </p:style>
+      </p:cxnSp>
+      <p:sp>
+        <p:nvSpPr>
+          <p:cNvPr id="71" name="TextBox 70"/>
+          <p:cNvSpPr txBox="1"/>
+          <p:nvPr/>
+        </p:nvSpPr>
+        <p:spPr>
+          <a:xfrm>
+            <a:off x="7749405" y="943116"/>
+            <a:ext cx="390022" cy="276999"/>
+          </a:xfrm>
+          <a:prstGeom prst="rect">
+            <a:avLst/>
+          </a:prstGeom>
+          <a:noFill/>
+        </p:spPr>
+        <p:txBody>
+          <a:bodyPr wrap="square" rtlCol="0">
+            <a:spAutoFit/>
+          </a:bodyPr>
+          <a:lstStyle/>
+          <a:p>
+            <a:r>
+              <a:rPr lang="en-US" sz="1200" dirty="0" smtClean="0">
+                <a:latin typeface="Microsoft Sans Serif"/>
+                <a:cs typeface="Microsoft Sans Serif"/>
+              </a:rPr>
+              <a:t>PA</a:t>
+            </a:r>
+            <a:endParaRPr lang="en-US" sz="1200" dirty="0">
+              <a:latin typeface="Microsoft Sans Serif"/>
+              <a:cs typeface="Microsoft Sans Serif"/>
+            </a:endParaRPr>
+          </a:p>
+        </p:txBody>
+      </p:sp>
+      <p:grpSp>
+        <p:nvGrpSpPr>
+          <p:cNvPr id="73" name="Group 72"/>
+          <p:cNvGrpSpPr/>
+          <p:nvPr/>
+        </p:nvGrpSpPr>
+        <p:grpSpPr>
+          <a:xfrm>
+            <a:off x="660895" y="2200933"/>
+            <a:ext cx="2477527" cy="818551"/>
+            <a:chOff x="660895" y="1265080"/>
+            <a:chExt cx="2477527" cy="818551"/>
+          </a:xfrm>
+        </p:grpSpPr>
+        <p:cxnSp>
+          <p:nvCxnSpPr>
+            <p:cNvPr id="74" name="Straight Arrow Connector 73"/>
+            <p:cNvCxnSpPr/>
+            <p:nvPr/>
+          </p:nvCxnSpPr>
+          <p:spPr>
+            <a:xfrm flipV="1">
+              <a:off x="660895" y="1829717"/>
+              <a:ext cx="2477527" cy="4860"/>
+            </a:xfrm>
+            <a:prstGeom prst="straightConnector1">
+              <a:avLst/>
+            </a:prstGeom>
+            <a:ln>
+              <a:solidFill>
+                <a:schemeClr val="tx1"/>
+              </a:solidFill>
+              <a:tailEnd type="none"/>
+            </a:ln>
+            <a:effectLst/>
+          </p:spPr>
+          <p:style>
+            <a:lnRef idx="2">
+              <a:schemeClr val="accent1"/>
+            </a:lnRef>
+            <a:fillRef idx="0">
+              <a:schemeClr val="accent1"/>
+            </a:fillRef>
+            <a:effectRef idx="1">
+              <a:schemeClr val="accent1"/>
+            </a:effectRef>
+            <a:fontRef idx="minor">
+              <a:schemeClr val="tx1"/>
+            </a:fontRef>
+          </p:style>
+        </p:cxnSp>
+        <p:sp>
+          <p:nvSpPr>
+            <p:cNvPr id="75" name="Trapezoid 74"/>
+            <p:cNvSpPr/>
+            <p:nvPr/>
+          </p:nvSpPr>
+          <p:spPr>
+            <a:xfrm>
+              <a:off x="1616387" y="1542989"/>
+              <a:ext cx="161984" cy="286728"/>
+            </a:xfrm>
+            <a:prstGeom prst="trapezoid">
+              <a:avLst/>
+            </a:prstGeom>
+            <a:solidFill>
+              <a:srgbClr val="F9ED59"/>
+            </a:solidFill>
+            <a:ln>
+              <a:solidFill>
+                <a:schemeClr val="tx1"/>
+              </a:solidFill>
+            </a:ln>
+            <a:effectLst/>
+          </p:spPr>
+          <p:style>
+            <a:lnRef idx="1">
+              <a:schemeClr val="accent1"/>
+            </a:lnRef>
+            <a:fillRef idx="3">
+              <a:schemeClr val="accent1"/>
+            </a:fillRef>
+            <a:effectRef idx="2">
+              <a:schemeClr val="accent1"/>
+            </a:effectRef>
+            <a:fontRef idx="minor">
+              <a:schemeClr val="lt1"/>
+            </a:fontRef>
+          </p:style>
+          <p:txBody>
+            <a:bodyPr rtlCol="0" anchor="ctr"/>
+            <a:lstStyle/>
+            <a:p>
+              <a:pPr algn="ctr"/>
+              <a:endParaRPr lang="en-US"/>
+            </a:p>
+          </p:txBody>
+        </p:sp>
+        <p:cxnSp>
+          <p:nvCxnSpPr>
+            <p:cNvPr id="76" name="Straight Connector 75"/>
+            <p:cNvCxnSpPr>
+              <a:stCxn id="75" idx="0"/>
+              <a:endCxn id="75" idx="2"/>
+            </p:cNvCxnSpPr>
+            <p:nvPr/>
+          </p:nvCxnSpPr>
+          <p:spPr>
+            <a:xfrm>
+              <a:off x="1697379" y="1542989"/>
+              <a:ext cx="0" cy="286728"/>
+            </a:xfrm>
+            <a:prstGeom prst="line">
+              <a:avLst/>
+            </a:prstGeom>
+            <a:ln w="3175" cmpd="sng">
+              <a:solidFill>
+                <a:schemeClr val="tx1"/>
+              </a:solidFill>
+              <a:prstDash val="dash"/>
+            </a:ln>
+          </p:spPr>
+          <p:style>
+            <a:lnRef idx="2">
+              <a:schemeClr val="accent1"/>
+            </a:lnRef>
+            <a:fillRef idx="0">
+              <a:schemeClr val="accent1"/>
+            </a:fillRef>
+            <a:effectRef idx="1">
+              <a:schemeClr val="accent1"/>
+            </a:effectRef>
+            <a:fontRef idx="minor">
+              <a:schemeClr val="tx1"/>
+            </a:fontRef>
+          </p:style>
+        </p:cxnSp>
+        <p:sp>
+          <p:nvSpPr>
+            <p:cNvPr id="77" name="TextBox 76"/>
+            <p:cNvSpPr txBox="1"/>
+            <p:nvPr/>
+          </p:nvSpPr>
+          <p:spPr>
+            <a:xfrm>
+              <a:off x="764232" y="1806632"/>
+              <a:ext cx="278610" cy="276999"/>
+            </a:xfrm>
+            <a:prstGeom prst="rect">
+              <a:avLst/>
+            </a:prstGeom>
+            <a:noFill/>
+          </p:spPr>
+          <p:txBody>
+            <a:bodyPr wrap="square" rtlCol="0">
+              <a:spAutoFit/>
+            </a:bodyPr>
+            <a:lstStyle/>
+            <a:p>
+              <a:r>
+                <a:rPr lang="en-US" sz="1200" i="1" dirty="0" smtClean="0">
+                  <a:latin typeface="Microsoft Sans Serif"/>
+                  <a:cs typeface="Microsoft Sans Serif"/>
+                </a:rPr>
+                <a:t>f</a:t>
+              </a:r>
+              <a:r>
+                <a:rPr lang="en-US" sz="1200" baseline="-25000" dirty="0" smtClean="0">
+                  <a:latin typeface="Microsoft Sans Serif"/>
+                  <a:cs typeface="Microsoft Sans Serif"/>
+                </a:rPr>
+                <a:t>1</a:t>
+              </a:r>
+              <a:endParaRPr lang="en-US" sz="1200" baseline="-25000" dirty="0">
+                <a:latin typeface="Microsoft Sans Serif"/>
+                <a:cs typeface="Microsoft Sans Serif"/>
+              </a:endParaRPr>
+            </a:p>
+          </p:txBody>
+        </p:sp>
+        <p:sp>
+          <p:nvSpPr>
+            <p:cNvPr id="78" name="TextBox 77"/>
+            <p:cNvSpPr txBox="1"/>
+            <p:nvPr/>
+          </p:nvSpPr>
+          <p:spPr>
+            <a:xfrm>
+              <a:off x="733529" y="1271966"/>
+              <a:ext cx="340017" cy="276999"/>
+            </a:xfrm>
+            <a:prstGeom prst="rect">
+              <a:avLst/>
+            </a:prstGeom>
+            <a:noFill/>
+          </p:spPr>
+          <p:txBody>
+            <a:bodyPr wrap="square" rtlCol="0">
+              <a:spAutoFit/>
+            </a:bodyPr>
+            <a:lstStyle/>
+            <a:p>
+              <a:r>
+                <a:rPr lang="en-US" sz="1200" i="1" dirty="0">
+                  <a:latin typeface="Microsoft Sans Serif"/>
+                  <a:cs typeface="Microsoft Sans Serif"/>
+                </a:rPr>
+                <a:t>S</a:t>
+              </a:r>
+              <a:r>
+                <a:rPr lang="en-US" sz="1200" baseline="-25000" dirty="0" smtClean="0">
+                  <a:latin typeface="Microsoft Sans Serif"/>
+                  <a:cs typeface="Microsoft Sans Serif"/>
+                </a:rPr>
+                <a:t>1</a:t>
+              </a:r>
+              <a:endParaRPr lang="en-US" sz="1200" baseline="-25000" dirty="0">
+                <a:latin typeface="Microsoft Sans Serif"/>
+                <a:cs typeface="Microsoft Sans Serif"/>
+              </a:endParaRPr>
+            </a:p>
+          </p:txBody>
+        </p:sp>
+        <p:sp>
+          <p:nvSpPr>
+            <p:cNvPr id="79" name="Trapezoid 78"/>
+            <p:cNvSpPr/>
+            <p:nvPr/>
+          </p:nvSpPr>
+          <p:spPr>
+            <a:xfrm>
+              <a:off x="778037" y="1542991"/>
+              <a:ext cx="251001" cy="286728"/>
+            </a:xfrm>
+            <a:prstGeom prst="trapezoid">
+              <a:avLst/>
+            </a:prstGeom>
+            <a:solidFill>
+              <a:srgbClr val="F9ED59"/>
+            </a:solidFill>
+            <a:ln>
+              <a:solidFill>
+                <a:schemeClr val="tx1"/>
+              </a:solidFill>
+            </a:ln>
+            <a:effectLst/>
+          </p:spPr>
+          <p:style>
+            <a:lnRef idx="1">
+              <a:schemeClr val="accent1"/>
+            </a:lnRef>
+            <a:fillRef idx="3">
+              <a:schemeClr val="accent1"/>
+            </a:fillRef>
+            <a:effectRef idx="2">
+              <a:schemeClr val="accent1"/>
+            </a:effectRef>
+            <a:fontRef idx="minor">
+              <a:schemeClr val="lt1"/>
+            </a:fontRef>
+          </p:style>
+          <p:txBody>
+            <a:bodyPr rtlCol="0" anchor="ctr"/>
+            <a:lstStyle/>
+            <a:p>
+              <a:pPr algn="ctr"/>
+              <a:endParaRPr lang="en-US"/>
+            </a:p>
+          </p:txBody>
+        </p:sp>
+        <p:cxnSp>
+          <p:nvCxnSpPr>
+            <p:cNvPr id="80" name="Straight Connector 79"/>
+            <p:cNvCxnSpPr>
+              <a:stCxn id="79" idx="0"/>
+              <a:endCxn id="79" idx="2"/>
+            </p:cNvCxnSpPr>
+            <p:nvPr/>
+          </p:nvCxnSpPr>
+          <p:spPr>
+            <a:xfrm>
+              <a:off x="903538" y="1542991"/>
+              <a:ext cx="0" cy="286728"/>
+            </a:xfrm>
+            <a:prstGeom prst="line">
+              <a:avLst/>
+            </a:prstGeom>
+            <a:ln w="3175" cmpd="sng">
+              <a:solidFill>
+                <a:schemeClr val="tx1"/>
+              </a:solidFill>
+              <a:prstDash val="dash"/>
+            </a:ln>
+          </p:spPr>
+          <p:style>
+            <a:lnRef idx="2">
+              <a:schemeClr val="accent1"/>
+            </a:lnRef>
+            <a:fillRef idx="0">
+              <a:schemeClr val="accent1"/>
+            </a:fillRef>
+            <a:effectRef idx="1">
+              <a:schemeClr val="accent1"/>
+            </a:effectRef>
+            <a:fontRef idx="minor">
+              <a:schemeClr val="tx1"/>
+            </a:fontRef>
+          </p:style>
+        </p:cxnSp>
+        <p:sp>
+          <p:nvSpPr>
+            <p:cNvPr id="81" name="TextBox 80"/>
+            <p:cNvSpPr txBox="1"/>
+            <p:nvPr/>
+          </p:nvSpPr>
+          <p:spPr>
+            <a:xfrm>
+              <a:off x="1558074" y="1806631"/>
+              <a:ext cx="278610" cy="276999"/>
+            </a:xfrm>
+            <a:prstGeom prst="rect">
+              <a:avLst/>
+            </a:prstGeom>
+            <a:noFill/>
+          </p:spPr>
+          <p:txBody>
+            <a:bodyPr wrap="square" rtlCol="0">
+              <a:spAutoFit/>
+            </a:bodyPr>
+            <a:lstStyle/>
+            <a:p>
+              <a:r>
+                <a:rPr lang="en-US" sz="1200" i="1" dirty="0" smtClean="0">
+                  <a:latin typeface="Microsoft Sans Serif"/>
+                  <a:cs typeface="Microsoft Sans Serif"/>
+                </a:rPr>
+                <a:t>f</a:t>
+              </a:r>
+              <a:r>
+                <a:rPr lang="en-US" sz="1200" baseline="-25000" dirty="0">
+                  <a:latin typeface="Microsoft Sans Serif"/>
+                  <a:cs typeface="Microsoft Sans Serif"/>
+                </a:rPr>
+                <a:t>2</a:t>
+              </a:r>
+            </a:p>
+          </p:txBody>
+        </p:sp>
+        <p:sp>
+          <p:nvSpPr>
+            <p:cNvPr id="82" name="TextBox 81"/>
+            <p:cNvSpPr txBox="1"/>
+            <p:nvPr/>
+          </p:nvSpPr>
+          <p:spPr>
+            <a:xfrm>
+              <a:off x="1527372" y="1271965"/>
+              <a:ext cx="340017" cy="276999"/>
+            </a:xfrm>
+            <a:prstGeom prst="rect">
+              <a:avLst/>
+            </a:prstGeom>
+            <a:noFill/>
+          </p:spPr>
+          <p:txBody>
+            <a:bodyPr wrap="square" rtlCol="0">
+              <a:spAutoFit/>
+            </a:bodyPr>
+            <a:lstStyle/>
+            <a:p>
+              <a:r>
+                <a:rPr lang="en-US" sz="1200" i="1" dirty="0" smtClean="0">
+                  <a:latin typeface="Microsoft Sans Serif"/>
+                  <a:cs typeface="Microsoft Sans Serif"/>
+                </a:rPr>
+                <a:t>S</a:t>
+              </a:r>
+              <a:r>
+                <a:rPr lang="en-US" sz="1200" baseline="-25000" dirty="0">
+                  <a:latin typeface="Microsoft Sans Serif"/>
+                  <a:cs typeface="Microsoft Sans Serif"/>
+                </a:rPr>
+                <a:t>2</a:t>
+              </a:r>
+            </a:p>
+          </p:txBody>
+        </p:sp>
+        <p:grpSp>
+          <p:nvGrpSpPr>
+            <p:cNvPr id="83" name="Group 82"/>
+            <p:cNvGrpSpPr/>
+            <p:nvPr/>
+          </p:nvGrpSpPr>
+          <p:grpSpPr>
+            <a:xfrm>
+              <a:off x="2538181" y="1536104"/>
+              <a:ext cx="297638" cy="286728"/>
+              <a:chOff x="1621385" y="2054619"/>
+              <a:chExt cx="161984" cy="382304"/>
+            </a:xfrm>
+          </p:grpSpPr>
+          <p:sp>
+            <p:nvSpPr>
+              <p:cNvPr id="86" name="Trapezoid 85"/>
+              <p:cNvSpPr/>
+              <p:nvPr/>
+            </p:nvSpPr>
+            <p:spPr>
+              <a:xfrm>
+                <a:off x="1621385" y="2054619"/>
+                <a:ext cx="161984" cy="382304"/>
+              </a:xfrm>
+              <a:prstGeom prst="trapezoid">
+                <a:avLst/>
+              </a:prstGeom>
+              <a:solidFill>
+                <a:srgbClr val="F9ED59"/>
+              </a:solidFill>
+              <a:ln>
+                <a:solidFill>
+                  <a:schemeClr val="tx1"/>
+                </a:solidFill>
+              </a:ln>
+              <a:effectLst/>
+            </p:spPr>
+            <p:style>
+              <a:lnRef idx="1">
+                <a:schemeClr val="accent1"/>
+              </a:lnRef>
+              <a:fillRef idx="3">
+                <a:schemeClr val="accent1"/>
+              </a:fillRef>
+              <a:effectRef idx="2">
+                <a:schemeClr val="accent1"/>
+              </a:effectRef>
+              <a:fontRef idx="minor">
+                <a:schemeClr val="lt1"/>
+              </a:fontRef>
+            </p:style>
+            <p:txBody>
+              <a:bodyPr rtlCol="0" anchor="ctr"/>
+              <a:lstStyle/>
+              <a:p>
+                <a:pPr algn="ctr"/>
+                <a:endParaRPr lang="en-US"/>
+              </a:p>
+            </p:txBody>
+          </p:sp>
+          <p:cxnSp>
+            <p:nvCxnSpPr>
+              <p:cNvPr id="87" name="Straight Connector 86"/>
+              <p:cNvCxnSpPr>
+                <a:stCxn id="86" idx="0"/>
+                <a:endCxn id="86" idx="2"/>
+              </p:cNvCxnSpPr>
+              <p:nvPr/>
+            </p:nvCxnSpPr>
+            <p:spPr>
+              <a:xfrm>
+                <a:off x="1702377" y="2054619"/>
+                <a:ext cx="0" cy="382304"/>
+              </a:xfrm>
+              <a:prstGeom prst="line">
+                <a:avLst/>
+              </a:prstGeom>
+              <a:ln w="3175" cmpd="sng">
+                <a:solidFill>
+                  <a:schemeClr val="tx1"/>
+                </a:solidFill>
+                <a:prstDash val="dash"/>
+              </a:ln>
+            </p:spPr>
+            <p:style>
+              <a:lnRef idx="2">
+                <a:schemeClr val="accent1"/>
+              </a:lnRef>
+              <a:fillRef idx="0">
+                <a:schemeClr val="accent1"/>
+              </a:fillRef>
+              <a:effectRef idx="1">
+                <a:schemeClr val="accent1"/>
+              </a:effectRef>
+              <a:fontRef idx="minor">
+                <a:schemeClr val="tx1"/>
+              </a:fontRef>
+            </p:style>
+          </p:cxnSp>
+        </p:grpSp>
+        <p:sp>
+          <p:nvSpPr>
+            <p:cNvPr id="84" name="TextBox 83"/>
+            <p:cNvSpPr txBox="1"/>
+            <p:nvPr/>
+          </p:nvSpPr>
+          <p:spPr>
+            <a:xfrm>
+              <a:off x="2547696" y="1799746"/>
+              <a:ext cx="278610" cy="276999"/>
+            </a:xfrm>
+            <a:prstGeom prst="rect">
+              <a:avLst/>
+            </a:prstGeom>
+            <a:noFill/>
+          </p:spPr>
+          <p:txBody>
+            <a:bodyPr wrap="square" rtlCol="0">
+              <a:spAutoFit/>
+            </a:bodyPr>
+            <a:lstStyle/>
+            <a:p>
+              <a:r>
+                <a:rPr lang="en-US" sz="1200" i="1" dirty="0" smtClean="0">
+                  <a:latin typeface="Microsoft Sans Serif"/>
+                  <a:cs typeface="Microsoft Sans Serif"/>
+                </a:rPr>
+                <a:t>f</a:t>
+              </a:r>
+              <a:r>
+                <a:rPr lang="en-US" sz="1200" baseline="-25000" dirty="0" smtClean="0">
+                  <a:latin typeface="Microsoft Sans Serif"/>
+                  <a:cs typeface="Microsoft Sans Serif"/>
+                </a:rPr>
+                <a:t>4</a:t>
+              </a:r>
+              <a:endParaRPr lang="en-US" sz="1200" baseline="-25000" dirty="0">
+                <a:latin typeface="Microsoft Sans Serif"/>
+                <a:cs typeface="Microsoft Sans Serif"/>
+              </a:endParaRPr>
+            </a:p>
+          </p:txBody>
+        </p:sp>
+        <p:sp>
+          <p:nvSpPr>
+            <p:cNvPr id="85" name="TextBox 84"/>
+            <p:cNvSpPr txBox="1"/>
+            <p:nvPr/>
+          </p:nvSpPr>
+          <p:spPr>
+            <a:xfrm>
+              <a:off x="2516994" y="1265080"/>
+              <a:ext cx="340017" cy="276999"/>
+            </a:xfrm>
+            <a:prstGeom prst="rect">
+              <a:avLst/>
+            </a:prstGeom>
+            <a:noFill/>
+          </p:spPr>
+          <p:txBody>
+            <a:bodyPr wrap="square" rtlCol="0">
+              <a:spAutoFit/>
+            </a:bodyPr>
+            <a:lstStyle/>
+            <a:p>
+              <a:r>
+                <a:rPr lang="en-US" sz="1200" i="1" dirty="0" smtClean="0">
+                  <a:latin typeface="Microsoft Sans Serif"/>
+                  <a:cs typeface="Microsoft Sans Serif"/>
+                </a:rPr>
+                <a:t>S</a:t>
+              </a:r>
+              <a:r>
+                <a:rPr lang="en-US" sz="1200" baseline="-25000" dirty="0">
+                  <a:latin typeface="Microsoft Sans Serif"/>
+                  <a:cs typeface="Microsoft Sans Serif"/>
+                </a:rPr>
+                <a:t>3</a:t>
+              </a:r>
+            </a:p>
+          </p:txBody>
+        </p:sp>
+      </p:grpSp>
+      <p:sp>
+        <p:nvSpPr>
+          <p:cNvPr id="89" name="TextBox 88"/>
+          <p:cNvSpPr txBox="1"/>
+          <p:nvPr/>
+        </p:nvSpPr>
+        <p:spPr>
+          <a:xfrm>
+            <a:off x="850358" y="1790609"/>
+            <a:ext cx="1560578" cy="400110"/>
+          </a:xfrm>
+          <a:prstGeom prst="rect">
+            <a:avLst/>
+          </a:prstGeom>
+          <a:noFill/>
+        </p:spPr>
+        <p:txBody>
+          <a:bodyPr wrap="square" rtlCol="0">
+            <a:spAutoFit/>
+          </a:bodyPr>
+          <a:lstStyle>
+            <a:defPPr>
+              <a:defRPr lang="en-US"/>
+            </a:defPPr>
+            <a:lvl1pPr>
+              <a:defRPr sz="1200" i="1">
+                <a:latin typeface="Microsoft Sans Serif"/>
+                <a:cs typeface="Microsoft Sans Serif"/>
+              </a:defRPr>
+            </a:lvl1pPr>
+          </a:lstStyle>
+          <a:p>
+            <a:pPr algn="r"/>
+            <a:r>
+              <a:rPr lang="en-US" sz="1000" dirty="0" smtClean="0"/>
+              <a:t>S</a:t>
+            </a:r>
+            <a:r>
+              <a:rPr lang="en-US" sz="1000" i="0" baseline="-25000" dirty="0" smtClean="0"/>
+              <a:t>3</a:t>
+            </a:r>
+            <a:r>
+              <a:rPr lang="en-US" sz="1000" i="0" dirty="0" smtClean="0"/>
+              <a:t>(</a:t>
+            </a:r>
+            <a:r>
+              <a:rPr lang="en-US" sz="1000" dirty="0" smtClean="0"/>
+              <a:t>t </a:t>
+            </a:r>
+            <a:r>
+              <a:rPr lang="en-US" sz="1000" i="0" dirty="0" smtClean="0"/>
+              <a:t>) is moved to a new spectrum position:</a:t>
+            </a:r>
+          </a:p>
+        </p:txBody>
+      </p:sp>
+      <p:cxnSp>
+        <p:nvCxnSpPr>
+          <p:cNvPr id="91" name="Straight Arrow Connector 90"/>
+          <p:cNvCxnSpPr>
+            <a:stCxn id="26" idx="2"/>
+            <a:endCxn id="85" idx="0"/>
+          </p:cNvCxnSpPr>
+          <p:nvPr/>
+        </p:nvCxnSpPr>
+        <p:spPr>
+          <a:xfrm>
+            <a:off x="2184117" y="1718680"/>
+            <a:ext cx="502886" cy="482253"/>
+          </a:xfrm>
+          <a:prstGeom prst="straightConnector1">
+            <a:avLst/>
+          </a:prstGeom>
+          <a:ln w="12700" cmpd="sng">
+            <a:solidFill>
+              <a:schemeClr val="accent2"/>
+            </a:solidFill>
+            <a:tailEnd type="triangle"/>
+          </a:ln>
+          <a:effectLst/>
+        </p:spPr>
+        <p:style>
+          <a:lnRef idx="2">
+            <a:schemeClr val="accent1"/>
+          </a:lnRef>
+          <a:fillRef idx="0">
+            <a:schemeClr val="accent1"/>
+          </a:fillRef>
+          <a:effectRef idx="1">
+            <a:schemeClr val="accent1"/>
+          </a:effectRef>
+          <a:fontRef idx="minor">
+            <a:schemeClr val="tx1"/>
+          </a:fontRef>
+        </p:style>
+      </p:cxnSp>
+      <p:sp>
+        <p:nvSpPr>
+          <p:cNvPr id="92" name="TextBox 91"/>
+          <p:cNvSpPr txBox="1"/>
+          <p:nvPr/>
+        </p:nvSpPr>
+        <p:spPr>
+          <a:xfrm>
+            <a:off x="3177652" y="2300623"/>
+            <a:ext cx="1834089" cy="861774"/>
+          </a:xfrm>
+          <a:prstGeom prst="rect">
+            <a:avLst/>
+          </a:prstGeom>
+          <a:solidFill>
+            <a:schemeClr val="accent3">
+              <a:lumMod val="20000"/>
+              <a:lumOff val="80000"/>
+            </a:schemeClr>
+          </a:solidFill>
+        </p:spPr>
+        <p:txBody>
+          <a:bodyPr wrap="square" rtlCol="0">
+            <a:spAutoFit/>
+          </a:bodyPr>
+          <a:lstStyle>
+            <a:defPPr>
+              <a:defRPr lang="en-US"/>
+            </a:defPPr>
+            <a:lvl1pPr>
+              <a:defRPr sz="1200" i="1">
+                <a:latin typeface="Microsoft Sans Serif"/>
+                <a:cs typeface="Microsoft Sans Serif"/>
+              </a:defRPr>
+            </a:lvl1pPr>
+          </a:lstStyle>
+          <a:p>
+            <a:r>
+              <a:rPr lang="en-US" sz="1000" i="0" dirty="0" smtClean="0"/>
+              <a:t>The power envelop of each individual signal segment doesn’t change even if the spectrum position of the segment is changed.</a:t>
+            </a:r>
+          </a:p>
+        </p:txBody>
+      </p:sp>
+      <p:sp>
+        <p:nvSpPr>
+          <p:cNvPr id="93" name="Down Arrow 92"/>
+          <p:cNvSpPr/>
+          <p:nvPr/>
+        </p:nvSpPr>
+        <p:spPr>
+          <a:xfrm>
+            <a:off x="3955872" y="1883203"/>
+            <a:ext cx="102181" cy="378492"/>
+          </a:xfrm>
+          <a:prstGeom prst="downArrow">
+            <a:avLst/>
+          </a:prstGeom>
+        </p:spPr>
+        <p:style>
+          <a:lnRef idx="1">
+            <a:schemeClr val="accent1"/>
+          </a:lnRef>
+          <a:fillRef idx="3">
+            <a:schemeClr val="accent1"/>
+          </a:fillRef>
+          <a:effectRef idx="2">
+            <a:schemeClr val="accent1"/>
+          </a:effectRef>
+          <a:fontRef idx="minor">
+            <a:schemeClr val="lt1"/>
+          </a:fontRef>
+        </p:style>
+        <p:txBody>
+          <a:bodyPr rtlCol="0" anchor="ctr"/>
+          <a:lstStyle/>
+          <a:p>
+            <a:pPr algn="ctr"/>
+            <a:endParaRPr lang="en-US"/>
+          </a:p>
+        </p:txBody>
+      </p:sp>
+      <p:sp>
+        <p:nvSpPr>
+          <p:cNvPr id="94" name="TextBox 93"/>
+          <p:cNvSpPr txBox="1"/>
+          <p:nvPr/>
+        </p:nvSpPr>
+        <p:spPr>
+          <a:xfrm>
+            <a:off x="5858604" y="2300025"/>
+            <a:ext cx="2111530" cy="861774"/>
+          </a:xfrm>
+          <a:prstGeom prst="rect">
+            <a:avLst/>
+          </a:prstGeom>
+          <a:solidFill>
+            <a:schemeClr val="accent3">
+              <a:lumMod val="20000"/>
+              <a:lumOff val="80000"/>
+            </a:schemeClr>
+          </a:solidFill>
+        </p:spPr>
+        <p:txBody>
+          <a:bodyPr wrap="square" rtlCol="0">
+            <a:spAutoFit/>
+          </a:bodyPr>
+          <a:lstStyle>
+            <a:defPPr>
+              <a:defRPr lang="en-US"/>
+            </a:defPPr>
+            <a:lvl1pPr algn="ctr">
+              <a:defRPr sz="1000" i="0">
+                <a:latin typeface="Microsoft Sans Serif"/>
+                <a:cs typeface="Microsoft Sans Serif"/>
+              </a:defRPr>
+            </a:lvl1pPr>
+          </a:lstStyle>
+          <a:p>
+            <a:pPr algn="l"/>
+            <a:r>
+              <a:rPr lang="en-US" dirty="0"/>
+              <a:t>The power envelope upper bound for a</a:t>
+            </a:r>
+            <a:r>
+              <a:rPr lang="en-US" dirty="0" smtClean="0"/>
+              <a:t> </a:t>
+            </a:r>
+            <a:r>
+              <a:rPr lang="en-US" dirty="0"/>
+              <a:t>multi-segment sum signal doesn’t </a:t>
+            </a:r>
+            <a:r>
+              <a:rPr lang="en-US" dirty="0" smtClean="0"/>
+              <a:t>change, </a:t>
+            </a:r>
+            <a:r>
+              <a:rPr lang="en-US" dirty="0"/>
+              <a:t>even if the spectrum positions of individual segments </a:t>
+            </a:r>
+            <a:r>
+              <a:rPr lang="en-US" dirty="0" smtClean="0"/>
+              <a:t>are moved around.</a:t>
+            </a:r>
+            <a:endParaRPr lang="en-US" dirty="0"/>
+          </a:p>
+        </p:txBody>
+      </p:sp>
+      <p:sp>
+        <p:nvSpPr>
+          <p:cNvPr id="95" name="Right Arrow 94"/>
+          <p:cNvSpPr/>
+          <p:nvPr/>
+        </p:nvSpPr>
+        <p:spPr>
+          <a:xfrm>
+            <a:off x="5089598" y="2695846"/>
+            <a:ext cx="671476" cy="97223"/>
+          </a:xfrm>
+          <a:prstGeom prst="rightArrow">
+            <a:avLst/>
+          </a:prstGeom>
+        </p:spPr>
+        <p:style>
+          <a:lnRef idx="1">
+            <a:schemeClr val="accent1"/>
+          </a:lnRef>
+          <a:fillRef idx="3">
+            <a:schemeClr val="accent1"/>
+          </a:fillRef>
+          <a:effectRef idx="2">
+            <a:schemeClr val="accent1"/>
+          </a:effectRef>
+          <a:fontRef idx="minor">
+            <a:schemeClr val="lt1"/>
+          </a:fontRef>
+        </p:style>
+        <p:txBody>
+          <a:bodyPr rtlCol="0" anchor="ctr"/>
+          <a:lstStyle/>
+          <a:p>
+            <a:pPr algn="ctr"/>
+            <a:endParaRPr lang="en-US"/>
+          </a:p>
+        </p:txBody>
+      </p:sp>
+      <p:sp>
+        <p:nvSpPr>
+          <p:cNvPr id="96" name="TextBox 95"/>
+          <p:cNvSpPr txBox="1"/>
+          <p:nvPr/>
+        </p:nvSpPr>
+        <p:spPr>
+          <a:xfrm>
+            <a:off x="669618" y="4468091"/>
+            <a:ext cx="7845119" cy="246221"/>
+          </a:xfrm>
+          <a:prstGeom prst="rect">
+            <a:avLst/>
+          </a:prstGeom>
+          <a:solidFill>
+            <a:srgbClr val="FFFF00"/>
+          </a:solidFill>
+        </p:spPr>
+        <p:txBody>
+          <a:bodyPr wrap="square" rtlCol="0">
+            <a:spAutoFit/>
+          </a:bodyPr>
+          <a:lstStyle>
+            <a:defPPr>
+              <a:defRPr lang="en-US"/>
+            </a:defPPr>
+            <a:lvl1pPr>
+              <a:defRPr sz="1200" i="1">
+                <a:latin typeface="Microsoft Sans Serif"/>
+                <a:cs typeface="Microsoft Sans Serif"/>
+              </a:defRPr>
+            </a:lvl1pPr>
+          </a:lstStyle>
+          <a:p>
+            <a:r>
+              <a:rPr lang="en-US" sz="1000" b="1" u="sng" dirty="0" smtClean="0"/>
+              <a:t>It is sufficient to investigate the peak-to-mean envelope power ratio (PMEPR) for signals of evenly divided and evenly spaced segments.  </a:t>
+            </a:r>
+          </a:p>
+        </p:txBody>
+      </p:sp>
+      <p:sp>
+        <p:nvSpPr>
+          <p:cNvPr id="97" name="TextBox 96"/>
+          <p:cNvSpPr txBox="1"/>
+          <p:nvPr/>
+        </p:nvSpPr>
+        <p:spPr>
+          <a:xfrm>
+            <a:off x="811430" y="3442251"/>
+            <a:ext cx="7419628" cy="553998"/>
+          </a:xfrm>
+          <a:prstGeom prst="rect">
+            <a:avLst/>
+          </a:prstGeom>
+          <a:solidFill>
+            <a:schemeClr val="accent3">
+              <a:lumMod val="20000"/>
+              <a:lumOff val="80000"/>
+            </a:schemeClr>
+          </a:solidFill>
+        </p:spPr>
+        <p:txBody>
+          <a:bodyPr wrap="square" rtlCol="0">
+            <a:spAutoFit/>
+          </a:bodyPr>
+          <a:lstStyle>
+            <a:defPPr>
+              <a:defRPr lang="en-US"/>
+            </a:defPPr>
+            <a:lvl1pPr>
+              <a:defRPr sz="1000" i="0">
+                <a:latin typeface="Microsoft Sans Serif"/>
+                <a:cs typeface="Microsoft Sans Serif"/>
+              </a:defRPr>
+            </a:lvl1pPr>
+          </a:lstStyle>
+          <a:p>
+            <a:r>
+              <a:rPr lang="en-US" dirty="0"/>
+              <a:t>The spectrum of unevenly divided segments and/or unevenly spaced segments can be constructed from </a:t>
+            </a:r>
+            <a:r>
+              <a:rPr lang="en-US" dirty="0" smtClean="0"/>
+              <a:t>an </a:t>
+            </a:r>
+            <a:r>
+              <a:rPr lang="en-US" dirty="0"/>
+              <a:t>evenly divided and </a:t>
+            </a:r>
+            <a:r>
+              <a:rPr lang="en-US" dirty="0" smtClean="0"/>
+              <a:t>evenly spaced multi-segments spectrum by moving the spectrum positions of individual or a group of segments. For example, </a:t>
+            </a:r>
+            <a:r>
+              <a:rPr lang="en-US" i="1" dirty="0" smtClean="0"/>
+              <a:t>S</a:t>
+            </a:r>
+            <a:r>
+              <a:rPr lang="en-US" baseline="-25000" dirty="0" smtClean="0"/>
+              <a:t>1</a:t>
+            </a:r>
+            <a:r>
+              <a:rPr lang="en-US" dirty="0" smtClean="0"/>
+              <a:t> is twice the bandwidth of </a:t>
+            </a:r>
+            <a:r>
+              <a:rPr lang="en-US" i="1" dirty="0" smtClean="0"/>
+              <a:t>S</a:t>
+            </a:r>
+            <a:r>
+              <a:rPr lang="en-US" baseline="-25000" dirty="0" smtClean="0"/>
+              <a:t>2,</a:t>
+            </a:r>
+            <a:r>
+              <a:rPr lang="en-US" dirty="0" smtClean="0"/>
+              <a:t> and </a:t>
+            </a:r>
+            <a:r>
+              <a:rPr lang="en-US" i="1" dirty="0" smtClean="0"/>
+              <a:t>S</a:t>
+            </a:r>
+            <a:r>
+              <a:rPr lang="en-US" baseline="-25000" dirty="0" smtClean="0"/>
+              <a:t>3</a:t>
+            </a:r>
+            <a:r>
+              <a:rPr lang="en-US" dirty="0" smtClean="0"/>
+              <a:t> is three times the bandwidth of </a:t>
+            </a:r>
+            <a:r>
+              <a:rPr lang="en-US" i="1" dirty="0" smtClean="0"/>
+              <a:t>S</a:t>
+            </a:r>
+            <a:r>
+              <a:rPr lang="en-US" baseline="-25000" dirty="0" smtClean="0"/>
+              <a:t>2</a:t>
+            </a:r>
+            <a:r>
+              <a:rPr lang="en-US" dirty="0" smtClean="0"/>
+              <a:t>. </a:t>
+            </a:r>
+            <a:endParaRPr lang="en-US" dirty="0"/>
+          </a:p>
+        </p:txBody>
+      </p:sp>
+      <p:sp>
+        <p:nvSpPr>
+          <p:cNvPr id="98" name="TextBox 97"/>
+          <p:cNvSpPr txBox="1"/>
+          <p:nvPr/>
+        </p:nvSpPr>
+        <p:spPr>
+          <a:xfrm>
+            <a:off x="188659" y="4165408"/>
+            <a:ext cx="1225385" cy="307777"/>
+          </a:xfrm>
+          <a:prstGeom prst="rect">
+            <a:avLst/>
+          </a:prstGeom>
+          <a:noFill/>
+        </p:spPr>
+        <p:txBody>
+          <a:bodyPr wrap="square" rtlCol="0">
+            <a:spAutoFit/>
+          </a:bodyPr>
+          <a:lstStyle>
+            <a:defPPr>
+              <a:defRPr lang="en-US"/>
+            </a:defPPr>
+            <a:lvl1pPr algn="r">
+              <a:defRPr sz="1000" i="0">
+                <a:latin typeface="Microsoft Sans Serif"/>
+                <a:cs typeface="Microsoft Sans Serif"/>
+              </a:defRPr>
+            </a:lvl1pPr>
+          </a:lstStyle>
+          <a:p>
+            <a:r>
+              <a:rPr lang="en-US" sz="1400" b="1" i="1" u="sng" dirty="0" smtClean="0"/>
+              <a:t>Conclusion:</a:t>
+            </a:r>
+            <a:endParaRPr lang="en-US" sz="1400" b="1" i="1" u="sng" dirty="0"/>
+          </a:p>
+        </p:txBody>
+      </p:sp>
+    </p:spTree>
+    <p:extLst>
+      <p:ext uri="{BB962C8B-B14F-4D97-AF65-F5344CB8AC3E}">
+        <p14:creationId xmlns:p14="http://schemas.microsoft.com/office/powerpoint/2010/main" val="2705533389"/>
       </p:ext>
     </p:extLst>
   </p:cSld>

</xml_diff>